<commit_message>
instruction changes for object-level FB
</commit_message>
<xml_diff>
--- a/experiments/exp1/static/images/$0.01/task_images.pptx
+++ b/experiments/exp1/static/images/$0.01/task_images.pptx
@@ -5,13 +5,14 @@
     <p:sldMasterId id="2147483672" r:id="rId1"/>
   </p:sldMasterIdLst>
   <p:notesMasterIdLst>
-    <p:notesMasterId r:id="rId6"/>
+    <p:notesMasterId r:id="rId7"/>
   </p:notesMasterIdLst>
   <p:sldIdLst>
     <p:sldId id="256" r:id="rId2"/>
     <p:sldId id="257" r:id="rId3"/>
     <p:sldId id="258" r:id="rId4"/>
     <p:sldId id="261" r:id="rId5"/>
+    <p:sldId id="262" r:id="rId6"/>
   </p:sldIdLst>
   <p:sldSz cx="12857163" cy="8001000"/>
   <p:notesSz cx="6858000" cy="9144000"/>
@@ -200,7 +201,7 @@
           <a:p>
             <a:fld id="{BA5244EF-28E7-0A45-8901-03971ADBA9CA}" type="datetimeFigureOut">
               <a:rPr lang="en-US" smtClean="0"/>
-              <a:t>5/28/17</a:t>
+              <a:t>5/31/17</a:t>
             </a:fld>
             <a:endParaRPr lang="en-US"/>
           </a:p>
@@ -599,7 +600,7 @@
           <a:p>
             <a:fld id="{FF930661-F093-4B49-A715-DBEF4BE1F4CF}" type="datetimeFigureOut">
               <a:rPr lang="en-US" smtClean="0"/>
-              <a:t>5/28/17</a:t>
+              <a:t>5/31/17</a:t>
             </a:fld>
             <a:endParaRPr lang="en-US"/>
           </a:p>
@@ -764,7 +765,7 @@
           <a:p>
             <a:fld id="{FF930661-F093-4B49-A715-DBEF4BE1F4CF}" type="datetimeFigureOut">
               <a:rPr lang="en-US" smtClean="0"/>
-              <a:t>5/28/17</a:t>
+              <a:t>5/31/17</a:t>
             </a:fld>
             <a:endParaRPr lang="en-US"/>
           </a:p>
@@ -939,7 +940,7 @@
           <a:p>
             <a:fld id="{FF930661-F093-4B49-A715-DBEF4BE1F4CF}" type="datetimeFigureOut">
               <a:rPr lang="en-US" smtClean="0"/>
-              <a:t>5/28/17</a:t>
+              <a:t>5/31/17</a:t>
             </a:fld>
             <a:endParaRPr lang="en-US"/>
           </a:p>
@@ -1104,7 +1105,7 @@
           <a:p>
             <a:fld id="{FF930661-F093-4B49-A715-DBEF4BE1F4CF}" type="datetimeFigureOut">
               <a:rPr lang="en-US" smtClean="0"/>
-              <a:t>5/28/17</a:t>
+              <a:t>5/31/17</a:t>
             </a:fld>
             <a:endParaRPr lang="en-US"/>
           </a:p>
@@ -1345,7 +1346,7 @@
           <a:p>
             <a:fld id="{FF930661-F093-4B49-A715-DBEF4BE1F4CF}" type="datetimeFigureOut">
               <a:rPr lang="en-US" smtClean="0"/>
-              <a:t>5/28/17</a:t>
+              <a:t>5/31/17</a:t>
             </a:fld>
             <a:endParaRPr lang="en-US"/>
           </a:p>
@@ -1572,7 +1573,7 @@
           <a:p>
             <a:fld id="{FF930661-F093-4B49-A715-DBEF4BE1F4CF}" type="datetimeFigureOut">
               <a:rPr lang="en-US" smtClean="0"/>
-              <a:t>5/28/17</a:t>
+              <a:t>5/31/17</a:t>
             </a:fld>
             <a:endParaRPr lang="en-US"/>
           </a:p>
@@ -1934,7 +1935,7 @@
           <a:p>
             <a:fld id="{FF930661-F093-4B49-A715-DBEF4BE1F4CF}" type="datetimeFigureOut">
               <a:rPr lang="en-US" smtClean="0"/>
-              <a:t>5/28/17</a:t>
+              <a:t>5/31/17</a:t>
             </a:fld>
             <a:endParaRPr lang="en-US"/>
           </a:p>
@@ -2047,7 +2048,7 @@
           <a:p>
             <a:fld id="{FF930661-F093-4B49-A715-DBEF4BE1F4CF}" type="datetimeFigureOut">
               <a:rPr lang="en-US" smtClean="0"/>
-              <a:t>5/28/17</a:t>
+              <a:t>5/31/17</a:t>
             </a:fld>
             <a:endParaRPr lang="en-US"/>
           </a:p>
@@ -2137,7 +2138,7 @@
           <a:p>
             <a:fld id="{FF930661-F093-4B49-A715-DBEF4BE1F4CF}" type="datetimeFigureOut">
               <a:rPr lang="en-US" smtClean="0"/>
-              <a:t>5/28/17</a:t>
+              <a:t>5/31/17</a:t>
             </a:fld>
             <a:endParaRPr lang="en-US"/>
           </a:p>
@@ -2409,7 +2410,7 @@
           <a:p>
             <a:fld id="{FF930661-F093-4B49-A715-DBEF4BE1F4CF}" type="datetimeFigureOut">
               <a:rPr lang="en-US" smtClean="0"/>
-              <a:t>5/28/17</a:t>
+              <a:t>5/31/17</a:t>
             </a:fld>
             <a:endParaRPr lang="en-US"/>
           </a:p>
@@ -2661,7 +2662,7 @@
           <a:p>
             <a:fld id="{FF930661-F093-4B49-A715-DBEF4BE1F4CF}" type="datetimeFigureOut">
               <a:rPr lang="en-US" smtClean="0"/>
-              <a:t>5/28/17</a:t>
+              <a:t>5/31/17</a:t>
             </a:fld>
             <a:endParaRPr lang="en-US"/>
           </a:p>
@@ -2869,7 +2870,7 @@
           <a:p>
             <a:fld id="{FF930661-F093-4B49-A715-DBEF4BE1F4CF}" type="datetimeFigureOut">
               <a:rPr lang="en-US" smtClean="0"/>
-              <a:t>5/28/17</a:t>
+              <a:t>5/31/17</a:t>
             </a:fld>
             <a:endParaRPr lang="en-US"/>
           </a:p>
@@ -5872,6 +5873,743 @@
     <p:extLst>
       <p:ext uri="{BB962C8B-B14F-4D97-AF65-F5344CB8AC3E}">
         <p14:creationId xmlns:p14="http://schemas.microsoft.com/office/powerpoint/2010/main" val="823564440"/>
+      </p:ext>
+    </p:extLst>
+  </p:cSld>
+  <p:clrMapOvr>
+    <a:masterClrMapping/>
+  </p:clrMapOvr>
+  <p:timing>
+    <p:tnLst>
+      <p:par>
+        <p:cTn id="1" dur="indefinite" restart="never" nodeType="tmRoot"/>
+      </p:par>
+    </p:tnLst>
+  </p:timing>
+</p:sld>
+</file>
+
+<file path=ppt/slides/slide5.xml><?xml version="1.0" encoding="utf-8"?>
+<p:sld xmlns:a="http://schemas.openxmlformats.org/drawingml/2006/main" xmlns:r="http://schemas.openxmlformats.org/officeDocument/2006/relationships" xmlns:p="http://schemas.openxmlformats.org/presentationml/2006/main">
+  <p:cSld>
+    <p:spTree>
+      <p:nvGrpSpPr>
+        <p:cNvPr id="1" name=""/>
+        <p:cNvGrpSpPr/>
+        <p:nvPr/>
+      </p:nvGrpSpPr>
+      <p:grpSpPr>
+        <a:xfrm>
+          <a:off x="0" y="0"/>
+          <a:ext cx="0" cy="0"/>
+          <a:chOff x="0" y="0"/>
+          <a:chExt cx="0" cy="0"/>
+        </a:xfrm>
+      </p:grpSpPr>
+      <p:pic>
+        <p:nvPicPr>
+          <p:cNvPr id="5" name="Picture 4"/>
+          <p:cNvPicPr>
+            <a:picLocks noChangeAspect="1"/>
+          </p:cNvPicPr>
+          <p:nvPr/>
+        </p:nvPicPr>
+        <p:blipFill>
+          <a:blip r:embed="rId2">
+            <a:extLst>
+              <a:ext uri="{28A0092B-C50C-407E-A947-70E740481C1C}">
+                <a14:useLocalDpi xmlns:a14="http://schemas.microsoft.com/office/drawing/2010/main" val="0"/>
+              </a:ext>
+            </a:extLst>
+          </a:blip>
+          <a:stretch>
+            <a:fillRect/>
+          </a:stretch>
+        </p:blipFill>
+        <p:spPr>
+          <a:xfrm>
+            <a:off x="-4333" y="-5400"/>
+            <a:ext cx="12852400" cy="8001000"/>
+          </a:xfrm>
+          <a:prstGeom prst="rect">
+            <a:avLst/>
+          </a:prstGeom>
+        </p:spPr>
+      </p:pic>
+      <p:sp>
+        <p:nvSpPr>
+          <p:cNvPr id="4" name="Rectangle 3"/>
+          <p:cNvSpPr/>
+          <p:nvPr/>
+        </p:nvSpPr>
+        <p:spPr>
+          <a:xfrm>
+            <a:off x="5666793" y="-571597"/>
+            <a:ext cx="2153812" cy="1186136"/>
+          </a:xfrm>
+          <a:prstGeom prst="rect">
+            <a:avLst/>
+          </a:prstGeom>
+          <a:solidFill>
+            <a:schemeClr val="bg1"/>
+          </a:solidFill>
+          <a:ln>
+            <a:noFill/>
+          </a:ln>
+        </p:spPr>
+        <p:style>
+          <a:lnRef idx="2">
+            <a:schemeClr val="accent1">
+              <a:shade val="50000"/>
+            </a:schemeClr>
+          </a:lnRef>
+          <a:fillRef idx="1">
+            <a:schemeClr val="accent1"/>
+          </a:fillRef>
+          <a:effectRef idx="0">
+            <a:schemeClr val="accent1"/>
+          </a:effectRef>
+          <a:fontRef idx="minor">
+            <a:schemeClr val="lt1"/>
+          </a:fontRef>
+        </p:style>
+        <p:txBody>
+          <a:bodyPr rtlCol="0" anchor="ctr"/>
+          <a:lstStyle/>
+          <a:p>
+            <a:pPr algn="ctr"/>
+            <a:endParaRPr lang="en-US"/>
+          </a:p>
+        </p:txBody>
+      </p:sp>
+      <p:sp>
+        <p:nvSpPr>
+          <p:cNvPr id="7" name="Rectangle 6"/>
+          <p:cNvSpPr/>
+          <p:nvPr/>
+        </p:nvSpPr>
+        <p:spPr>
+          <a:xfrm>
+            <a:off x="-162506" y="-376905"/>
+            <a:ext cx="2153812" cy="1186136"/>
+          </a:xfrm>
+          <a:prstGeom prst="rect">
+            <a:avLst/>
+          </a:prstGeom>
+          <a:solidFill>
+            <a:schemeClr val="bg1"/>
+          </a:solidFill>
+          <a:ln>
+            <a:noFill/>
+          </a:ln>
+        </p:spPr>
+        <p:style>
+          <a:lnRef idx="2">
+            <a:schemeClr val="accent1">
+              <a:shade val="50000"/>
+            </a:schemeClr>
+          </a:lnRef>
+          <a:fillRef idx="1">
+            <a:schemeClr val="accent1"/>
+          </a:fillRef>
+          <a:effectRef idx="0">
+            <a:schemeClr val="accent1"/>
+          </a:effectRef>
+          <a:fontRef idx="minor">
+            <a:schemeClr val="lt1"/>
+          </a:fontRef>
+        </p:style>
+        <p:txBody>
+          <a:bodyPr rtlCol="0" anchor="ctr"/>
+          <a:lstStyle/>
+          <a:p>
+            <a:pPr algn="ctr"/>
+            <a:endParaRPr lang="en-US"/>
+          </a:p>
+        </p:txBody>
+      </p:sp>
+      <p:pic>
+        <p:nvPicPr>
+          <p:cNvPr id="2" name="Picture 1"/>
+          <p:cNvPicPr>
+            <a:picLocks noChangeAspect="1"/>
+          </p:cNvPicPr>
+          <p:nvPr/>
+        </p:nvPicPr>
+        <p:blipFill rotWithShape="1">
+          <a:blip r:embed="rId3">
+            <a:extLst>
+              <a:ext uri="{28A0092B-C50C-407E-A947-70E740481C1C}">
+                <a14:useLocalDpi xmlns:a14="http://schemas.microsoft.com/office/drawing/2010/main" val="0"/>
+              </a:ext>
+            </a:extLst>
+          </a:blip>
+          <a:srcRect l="21698" t="30001" r="50397" b="50714"/>
+          <a:stretch/>
+        </p:blipFill>
+        <p:spPr>
+          <a:xfrm>
+            <a:off x="-4770883" y="4527550"/>
+            <a:ext cx="3572467" cy="1543050"/>
+          </a:xfrm>
+          <a:prstGeom prst="rect">
+            <a:avLst/>
+          </a:prstGeom>
+        </p:spPr>
+      </p:pic>
+      <p:sp>
+        <p:nvSpPr>
+          <p:cNvPr id="12" name="Rectangle 11"/>
+          <p:cNvSpPr/>
+          <p:nvPr/>
+        </p:nvSpPr>
+        <p:spPr>
+          <a:xfrm>
+            <a:off x="-664733" y="7626825"/>
+            <a:ext cx="14173200" cy="838200"/>
+          </a:xfrm>
+          <a:prstGeom prst="rect">
+            <a:avLst/>
+          </a:prstGeom>
+          <a:solidFill>
+            <a:schemeClr val="bg1"/>
+          </a:solidFill>
+          <a:ln>
+            <a:noFill/>
+          </a:ln>
+        </p:spPr>
+        <p:style>
+          <a:lnRef idx="2">
+            <a:schemeClr val="accent1">
+              <a:shade val="50000"/>
+            </a:schemeClr>
+          </a:lnRef>
+          <a:fillRef idx="1">
+            <a:schemeClr val="accent1"/>
+          </a:fillRef>
+          <a:effectRef idx="0">
+            <a:schemeClr val="accent1"/>
+          </a:effectRef>
+          <a:fontRef idx="minor">
+            <a:schemeClr val="lt1"/>
+          </a:fontRef>
+        </p:style>
+        <p:txBody>
+          <a:bodyPr rtlCol="0" anchor="ctr"/>
+          <a:lstStyle/>
+          <a:p>
+            <a:pPr algn="ctr"/>
+            <a:endParaRPr lang="en-US"/>
+          </a:p>
+        </p:txBody>
+      </p:sp>
+      <p:pic>
+        <p:nvPicPr>
+          <p:cNvPr id="13" name="Picture 12"/>
+          <p:cNvPicPr>
+            <a:picLocks noChangeAspect="1"/>
+          </p:cNvPicPr>
+          <p:nvPr/>
+        </p:nvPicPr>
+        <p:blipFill>
+          <a:blip r:embed="rId4">
+            <a:extLst>
+              <a:ext uri="{28A0092B-C50C-407E-A947-70E740481C1C}">
+                <a14:useLocalDpi xmlns:a14="http://schemas.microsoft.com/office/drawing/2010/main" val="0"/>
+              </a:ext>
+            </a:extLst>
+          </a:blip>
+          <a:stretch>
+            <a:fillRect/>
+          </a:stretch>
+        </p:blipFill>
+        <p:spPr>
+          <a:xfrm>
+            <a:off x="4618467" y="7633175"/>
+            <a:ext cx="3606800" cy="482600"/>
+          </a:xfrm>
+          <a:prstGeom prst="rect">
+            <a:avLst/>
+          </a:prstGeom>
+        </p:spPr>
+      </p:pic>
+      <p:pic>
+        <p:nvPicPr>
+          <p:cNvPr id="14" name="Picture 13"/>
+          <p:cNvPicPr>
+            <a:picLocks noChangeAspect="1"/>
+          </p:cNvPicPr>
+          <p:nvPr/>
+        </p:nvPicPr>
+        <p:blipFill>
+          <a:blip r:embed="rId5">
+            <a:extLst>
+              <a:ext uri="{28A0092B-C50C-407E-A947-70E740481C1C}">
+                <a14:useLocalDpi xmlns:a14="http://schemas.microsoft.com/office/drawing/2010/main" val="0"/>
+              </a:ext>
+            </a:extLst>
+          </a:blip>
+          <a:stretch>
+            <a:fillRect/>
+          </a:stretch>
+        </p:blipFill>
+        <p:spPr>
+          <a:xfrm>
+            <a:off x="5956300" y="3651250"/>
+            <a:ext cx="939800" cy="876300"/>
+          </a:xfrm>
+          <a:prstGeom prst="rect">
+            <a:avLst/>
+          </a:prstGeom>
+        </p:spPr>
+      </p:pic>
+      <p:sp>
+        <p:nvSpPr>
+          <p:cNvPr id="15" name="Rectangle 14"/>
+          <p:cNvSpPr/>
+          <p:nvPr/>
+        </p:nvSpPr>
+        <p:spPr>
+          <a:xfrm>
+            <a:off x="5956299" y="3695911"/>
+            <a:ext cx="901701" cy="723689"/>
+          </a:xfrm>
+          <a:prstGeom prst="rect">
+            <a:avLst/>
+          </a:prstGeom>
+          <a:solidFill>
+            <a:schemeClr val="bg1"/>
+          </a:solidFill>
+          <a:ln>
+            <a:noFill/>
+          </a:ln>
+        </p:spPr>
+        <p:style>
+          <a:lnRef idx="2">
+            <a:schemeClr val="accent1">
+              <a:shade val="50000"/>
+            </a:schemeClr>
+          </a:lnRef>
+          <a:fillRef idx="1">
+            <a:schemeClr val="accent1"/>
+          </a:fillRef>
+          <a:effectRef idx="0">
+            <a:schemeClr val="accent1"/>
+          </a:effectRef>
+          <a:fontRef idx="minor">
+            <a:schemeClr val="lt1"/>
+          </a:fontRef>
+        </p:style>
+        <p:txBody>
+          <a:bodyPr rtlCol="0" anchor="ctr"/>
+          <a:lstStyle/>
+          <a:p>
+            <a:pPr algn="ctr"/>
+            <a:endParaRPr lang="en-US"/>
+          </a:p>
+        </p:txBody>
+      </p:sp>
+      <p:pic>
+        <p:nvPicPr>
+          <p:cNvPr id="3" name="Picture 2"/>
+          <p:cNvPicPr>
+            <a:picLocks noChangeAspect="1"/>
+          </p:cNvPicPr>
+          <p:nvPr/>
+        </p:nvPicPr>
+        <p:blipFill rotWithShape="1">
+          <a:blip r:embed="rId6">
+            <a:extLst>
+              <a:ext uri="{28A0092B-C50C-407E-A947-70E740481C1C}">
+                <a14:useLocalDpi xmlns:a14="http://schemas.microsoft.com/office/drawing/2010/main" val="0"/>
+              </a:ext>
+            </a:extLst>
+          </a:blip>
+          <a:srcRect l="21568" t="30473" r="50455" b="50586"/>
+          <a:stretch/>
+        </p:blipFill>
+        <p:spPr>
+          <a:xfrm>
+            <a:off x="-4906533" y="2135829"/>
+            <a:ext cx="3581400" cy="1515421"/>
+          </a:xfrm>
+          <a:prstGeom prst="rect">
+            <a:avLst/>
+          </a:prstGeom>
+        </p:spPr>
+      </p:pic>
+      <p:sp>
+        <p:nvSpPr>
+          <p:cNvPr id="8" name="Rectangle 7"/>
+          <p:cNvSpPr/>
+          <p:nvPr/>
+        </p:nvSpPr>
+        <p:spPr>
+          <a:xfrm>
+            <a:off x="-627642" y="-480793"/>
+            <a:ext cx="14742683" cy="9644360"/>
+          </a:xfrm>
+          <a:prstGeom prst="rect">
+            <a:avLst/>
+          </a:prstGeom>
+          <a:solidFill>
+            <a:schemeClr val="tx1">
+              <a:lumMod val="75000"/>
+              <a:lumOff val="25000"/>
+              <a:alpha val="52000"/>
+            </a:schemeClr>
+          </a:solidFill>
+          <a:ln>
+            <a:noFill/>
+          </a:ln>
+        </p:spPr>
+        <p:style>
+          <a:lnRef idx="2">
+            <a:schemeClr val="accent1">
+              <a:shade val="50000"/>
+            </a:schemeClr>
+          </a:lnRef>
+          <a:fillRef idx="1">
+            <a:schemeClr val="accent1"/>
+          </a:fillRef>
+          <a:effectRef idx="0">
+            <a:schemeClr val="accent1"/>
+          </a:effectRef>
+          <a:fontRef idx="minor">
+            <a:schemeClr val="lt1"/>
+          </a:fontRef>
+        </p:style>
+        <p:txBody>
+          <a:bodyPr rtlCol="0" anchor="ctr"/>
+          <a:lstStyle/>
+          <a:p>
+            <a:pPr algn="ctr"/>
+            <a:endParaRPr lang="en-US"/>
+          </a:p>
+        </p:txBody>
+      </p:sp>
+      <p:pic>
+        <p:nvPicPr>
+          <p:cNvPr id="10" name="Picture 9"/>
+          <p:cNvPicPr>
+            <a:picLocks noChangeAspect="1"/>
+          </p:cNvPicPr>
+          <p:nvPr/>
+        </p:nvPicPr>
+        <p:blipFill>
+          <a:blip r:embed="rId7">
+            <a:extLst>
+              <a:ext uri="{28A0092B-C50C-407E-A947-70E740481C1C}">
+                <a14:useLocalDpi xmlns:a14="http://schemas.microsoft.com/office/drawing/2010/main" val="0"/>
+              </a:ext>
+            </a:extLst>
+          </a:blip>
+          <a:stretch>
+            <a:fillRect/>
+          </a:stretch>
+        </p:blipFill>
+        <p:spPr>
+          <a:xfrm>
+            <a:off x="-7070874" y="-1186500"/>
+            <a:ext cx="5308600" cy="2362200"/>
+          </a:xfrm>
+          <a:prstGeom prst="rect">
+            <a:avLst/>
+          </a:prstGeom>
+        </p:spPr>
+      </p:pic>
+      <p:pic>
+        <p:nvPicPr>
+          <p:cNvPr id="11" name="Picture 10"/>
+          <p:cNvPicPr>
+            <a:picLocks noChangeAspect="1"/>
+          </p:cNvPicPr>
+          <p:nvPr/>
+        </p:nvPicPr>
+        <p:blipFill>
+          <a:blip r:embed="rId8">
+            <a:extLst>
+              <a:ext uri="{28A0092B-C50C-407E-A947-70E740481C1C}">
+                <a14:useLocalDpi xmlns:a14="http://schemas.microsoft.com/office/drawing/2010/main" val="0"/>
+              </a:ext>
+            </a:extLst>
+          </a:blip>
+          <a:stretch>
+            <a:fillRect/>
+          </a:stretch>
+        </p:blipFill>
+        <p:spPr>
+          <a:xfrm>
+            <a:off x="14611633" y="4112270"/>
+            <a:ext cx="5359400" cy="3086100"/>
+          </a:xfrm>
+          <a:prstGeom prst="rect">
+            <a:avLst/>
+          </a:prstGeom>
+        </p:spPr>
+      </p:pic>
+      <p:pic>
+        <p:nvPicPr>
+          <p:cNvPr id="16" name="Picture 15"/>
+          <p:cNvPicPr>
+            <a:picLocks noChangeAspect="1"/>
+          </p:cNvPicPr>
+          <p:nvPr/>
+        </p:nvPicPr>
+        <p:blipFill rotWithShape="1">
+          <a:blip r:embed="rId9">
+            <a:extLst>
+              <a:ext uri="{28A0092B-C50C-407E-A947-70E740481C1C}">
+                <a14:useLocalDpi xmlns:a14="http://schemas.microsoft.com/office/drawing/2010/main" val="0"/>
+              </a:ext>
+            </a:extLst>
+          </a:blip>
+          <a:srcRect l="370" r="358"/>
+          <a:stretch/>
+        </p:blipFill>
+        <p:spPr>
+          <a:xfrm>
+            <a:off x="3787059" y="1906663"/>
+            <a:ext cx="5307716" cy="2781300"/>
+          </a:xfrm>
+          <a:prstGeom prst="rect">
+            <a:avLst/>
+          </a:prstGeom>
+        </p:spPr>
+      </p:pic>
+      <p:sp>
+        <p:nvSpPr>
+          <p:cNvPr id="17" name="TextBox 16"/>
+          <p:cNvSpPr txBox="1"/>
+          <p:nvPr/>
+        </p:nvSpPr>
+        <p:spPr>
+          <a:xfrm>
+            <a:off x="212563" y="131235"/>
+            <a:ext cx="2343911" cy="523220"/>
+          </a:xfrm>
+          <a:prstGeom prst="rect">
+            <a:avLst/>
+          </a:prstGeom>
+          <a:noFill/>
+        </p:spPr>
+        <p:txBody>
+          <a:bodyPr wrap="none" rtlCol="0">
+            <a:spAutoFit/>
+          </a:bodyPr>
+          <a:lstStyle/>
+          <a:p>
+            <a:r>
+              <a:rPr lang="en-US" sz="2800" dirty="0" smtClean="0">
+                <a:latin typeface="Helvetica" charset="0"/>
+                <a:ea typeface="Helvetica" charset="0"/>
+                <a:cs typeface="Helvetica" charset="0"/>
+              </a:rPr>
+              <a:t>Round: 1 / 12</a:t>
+            </a:r>
+            <a:endParaRPr lang="en-US" sz="2800" dirty="0">
+              <a:latin typeface="Helvetica" charset="0"/>
+              <a:ea typeface="Helvetica" charset="0"/>
+              <a:cs typeface="Helvetica" charset="0"/>
+            </a:endParaRPr>
+          </a:p>
+        </p:txBody>
+      </p:sp>
+      <p:sp>
+        <p:nvSpPr>
+          <p:cNvPr id="23" name="TextBox 22"/>
+          <p:cNvSpPr txBox="1"/>
+          <p:nvPr/>
+        </p:nvSpPr>
+        <p:spPr>
+          <a:xfrm>
+            <a:off x="5618409" y="127611"/>
+            <a:ext cx="1436932" cy="523220"/>
+          </a:xfrm>
+          <a:prstGeom prst="rect">
+            <a:avLst/>
+          </a:prstGeom>
+          <a:noFill/>
+        </p:spPr>
+        <p:txBody>
+          <a:bodyPr wrap="none" rtlCol="0">
+            <a:spAutoFit/>
+          </a:bodyPr>
+          <a:lstStyle/>
+          <a:p>
+            <a:r>
+              <a:rPr lang="en-US" sz="2800" b="1" dirty="0" smtClean="0">
+                <a:latin typeface="Helvetica" charset="0"/>
+                <a:ea typeface="Helvetica" charset="0"/>
+                <a:cs typeface="Helvetica" charset="0"/>
+              </a:rPr>
+              <a:t>Time: </a:t>
+            </a:r>
+            <a:r>
+              <a:rPr lang="en-US" sz="2800" b="1" dirty="0" smtClean="0">
+                <a:solidFill>
+                  <a:schemeClr val="accent6">
+                    <a:lumMod val="75000"/>
+                  </a:schemeClr>
+                </a:solidFill>
+                <a:latin typeface="Helvetica" charset="0"/>
+                <a:ea typeface="Helvetica" charset="0"/>
+                <a:cs typeface="Helvetica" charset="0"/>
+              </a:rPr>
+              <a:t>0</a:t>
+            </a:r>
+            <a:endParaRPr lang="en-US" sz="2800" b="1" dirty="0">
+              <a:solidFill>
+                <a:schemeClr val="accent6">
+                  <a:lumMod val="75000"/>
+                </a:schemeClr>
+              </a:solidFill>
+              <a:latin typeface="Helvetica" charset="0"/>
+              <a:ea typeface="Helvetica" charset="0"/>
+              <a:cs typeface="Helvetica" charset="0"/>
+            </a:endParaRPr>
+          </a:p>
+        </p:txBody>
+      </p:sp>
+      <p:sp>
+        <p:nvSpPr>
+          <p:cNvPr id="18" name="Rectangle 17"/>
+          <p:cNvSpPr/>
+          <p:nvPr/>
+        </p:nvSpPr>
+        <p:spPr>
+          <a:xfrm>
+            <a:off x="3964463" y="2122879"/>
+            <a:ext cx="4768990" cy="1186136"/>
+          </a:xfrm>
+          <a:prstGeom prst="rect">
+            <a:avLst/>
+          </a:prstGeom>
+          <a:solidFill>
+            <a:schemeClr val="bg1"/>
+          </a:solidFill>
+          <a:ln>
+            <a:noFill/>
+          </a:ln>
+        </p:spPr>
+        <p:style>
+          <a:lnRef idx="2">
+            <a:schemeClr val="accent1">
+              <a:shade val="50000"/>
+            </a:schemeClr>
+          </a:lnRef>
+          <a:fillRef idx="1">
+            <a:schemeClr val="accent1"/>
+          </a:fillRef>
+          <a:effectRef idx="0">
+            <a:schemeClr val="accent1"/>
+          </a:effectRef>
+          <a:fontRef idx="minor">
+            <a:schemeClr val="lt1"/>
+          </a:fontRef>
+        </p:style>
+        <p:txBody>
+          <a:bodyPr rtlCol="0" anchor="ctr"/>
+          <a:lstStyle/>
+          <a:p>
+            <a:pPr algn="ctr"/>
+            <a:r>
+              <a:rPr lang="en-US" smtClean="0"/>
+              <a:t>BaB</a:t>
+            </a:r>
+            <a:endParaRPr lang="en-US" dirty="0"/>
+          </a:p>
+        </p:txBody>
+      </p:sp>
+      <p:sp>
+        <p:nvSpPr>
+          <p:cNvPr id="6" name="TextBox 5"/>
+          <p:cNvSpPr txBox="1"/>
+          <p:nvPr/>
+        </p:nvSpPr>
+        <p:spPr>
+          <a:xfrm>
+            <a:off x="3787059" y="2266524"/>
+            <a:ext cx="5307716" cy="892552"/>
+          </a:xfrm>
+          <a:prstGeom prst="rect">
+            <a:avLst/>
+          </a:prstGeom>
+          <a:noFill/>
+        </p:spPr>
+        <p:txBody>
+          <a:bodyPr wrap="square" rtlCol="0">
+            <a:spAutoFit/>
+          </a:bodyPr>
+          <a:lstStyle/>
+          <a:p>
+            <a:pPr algn="ctr"/>
+            <a:r>
+              <a:rPr lang="en-US" sz="2600" b="1" dirty="0" smtClean="0">
+                <a:solidFill>
+                  <a:srgbClr val="C00000"/>
+                </a:solidFill>
+              </a:rPr>
+              <a:t>Bad move! You should have moved down.</a:t>
+            </a:r>
+            <a:endParaRPr lang="en-US" sz="2600" b="1" dirty="0">
+              <a:solidFill>
+                <a:srgbClr val="C00000"/>
+              </a:solidFill>
+            </a:endParaRPr>
+          </a:p>
+        </p:txBody>
+      </p:sp>
+      <p:sp>
+        <p:nvSpPr>
+          <p:cNvPr id="19" name="Rectangle 18"/>
+          <p:cNvSpPr/>
+          <p:nvPr/>
+        </p:nvSpPr>
+        <p:spPr>
+          <a:xfrm>
+            <a:off x="3913678" y="3645472"/>
+            <a:ext cx="5043710" cy="769436"/>
+          </a:xfrm>
+          <a:prstGeom prst="rect">
+            <a:avLst/>
+          </a:prstGeom>
+          <a:solidFill>
+            <a:schemeClr val="bg1"/>
+          </a:solidFill>
+          <a:ln>
+            <a:noFill/>
+          </a:ln>
+        </p:spPr>
+        <p:style>
+          <a:lnRef idx="2">
+            <a:schemeClr val="accent1">
+              <a:shade val="50000"/>
+            </a:schemeClr>
+          </a:lnRef>
+          <a:fillRef idx="1">
+            <a:schemeClr val="accent1"/>
+          </a:fillRef>
+          <a:effectRef idx="0">
+            <a:schemeClr val="accent1"/>
+          </a:effectRef>
+          <a:fontRef idx="minor">
+            <a:schemeClr val="lt1"/>
+          </a:fontRef>
+        </p:style>
+        <p:txBody>
+          <a:bodyPr rtlCol="0" anchor="ctr"/>
+          <a:lstStyle/>
+          <a:p>
+            <a:pPr algn="ctr"/>
+            <a:endParaRPr lang="en-US"/>
+          </a:p>
+        </p:txBody>
+      </p:sp>
+    </p:spTree>
+    <p:extLst>
+      <p:ext uri="{BB962C8B-B14F-4D97-AF65-F5344CB8AC3E}">
+        <p14:creationId xmlns:p14="http://schemas.microsoft.com/office/powerpoint/2010/main" val="1225682558"/>
       </p:ext>
     </p:extLst>
   </p:cSld>

</xml_diff>

<commit_message>
change instruciton image to say more/less information
</commit_message>
<xml_diff>
--- a/experiments/exp1/static/images/$0.01/task_images.pptx
+++ b/experiments/exp1/static/images/$0.01/task_images.pptx
@@ -201,7 +201,7 @@
           <a:p>
             <a:fld id="{BA5244EF-28E7-0A45-8901-03971ADBA9CA}" type="datetimeFigureOut">
               <a:rPr lang="en-US" smtClean="0"/>
-              <a:t>5/31/17</a:t>
+              <a:t>6/29/17</a:t>
             </a:fld>
             <a:endParaRPr lang="en-US"/>
           </a:p>
@@ -600,7 +600,7 @@
           <a:p>
             <a:fld id="{FF930661-F093-4B49-A715-DBEF4BE1F4CF}" type="datetimeFigureOut">
               <a:rPr lang="en-US" smtClean="0"/>
-              <a:t>5/31/17</a:t>
+              <a:t>6/29/17</a:t>
             </a:fld>
             <a:endParaRPr lang="en-US"/>
           </a:p>
@@ -765,7 +765,7 @@
           <a:p>
             <a:fld id="{FF930661-F093-4B49-A715-DBEF4BE1F4CF}" type="datetimeFigureOut">
               <a:rPr lang="en-US" smtClean="0"/>
-              <a:t>5/31/17</a:t>
+              <a:t>6/29/17</a:t>
             </a:fld>
             <a:endParaRPr lang="en-US"/>
           </a:p>
@@ -940,7 +940,7 @@
           <a:p>
             <a:fld id="{FF930661-F093-4B49-A715-DBEF4BE1F4CF}" type="datetimeFigureOut">
               <a:rPr lang="en-US" smtClean="0"/>
-              <a:t>5/31/17</a:t>
+              <a:t>6/29/17</a:t>
             </a:fld>
             <a:endParaRPr lang="en-US"/>
           </a:p>
@@ -1105,7 +1105,7 @@
           <a:p>
             <a:fld id="{FF930661-F093-4B49-A715-DBEF4BE1F4CF}" type="datetimeFigureOut">
               <a:rPr lang="en-US" smtClean="0"/>
-              <a:t>5/31/17</a:t>
+              <a:t>6/29/17</a:t>
             </a:fld>
             <a:endParaRPr lang="en-US"/>
           </a:p>
@@ -1346,7 +1346,7 @@
           <a:p>
             <a:fld id="{FF930661-F093-4B49-A715-DBEF4BE1F4CF}" type="datetimeFigureOut">
               <a:rPr lang="en-US" smtClean="0"/>
-              <a:t>5/31/17</a:t>
+              <a:t>6/29/17</a:t>
             </a:fld>
             <a:endParaRPr lang="en-US"/>
           </a:p>
@@ -1573,7 +1573,7 @@
           <a:p>
             <a:fld id="{FF930661-F093-4B49-A715-DBEF4BE1F4CF}" type="datetimeFigureOut">
               <a:rPr lang="en-US" smtClean="0"/>
-              <a:t>5/31/17</a:t>
+              <a:t>6/29/17</a:t>
             </a:fld>
             <a:endParaRPr lang="en-US"/>
           </a:p>
@@ -1935,7 +1935,7 @@
           <a:p>
             <a:fld id="{FF930661-F093-4B49-A715-DBEF4BE1F4CF}" type="datetimeFigureOut">
               <a:rPr lang="en-US" smtClean="0"/>
-              <a:t>5/31/17</a:t>
+              <a:t>6/29/17</a:t>
             </a:fld>
             <a:endParaRPr lang="en-US"/>
           </a:p>
@@ -2048,7 +2048,7 @@
           <a:p>
             <a:fld id="{FF930661-F093-4B49-A715-DBEF4BE1F4CF}" type="datetimeFigureOut">
               <a:rPr lang="en-US" smtClean="0"/>
-              <a:t>5/31/17</a:t>
+              <a:t>6/29/17</a:t>
             </a:fld>
             <a:endParaRPr lang="en-US"/>
           </a:p>
@@ -2138,7 +2138,7 @@
           <a:p>
             <a:fld id="{FF930661-F093-4B49-A715-DBEF4BE1F4CF}" type="datetimeFigureOut">
               <a:rPr lang="en-US" smtClean="0"/>
-              <a:t>5/31/17</a:t>
+              <a:t>6/29/17</a:t>
             </a:fld>
             <a:endParaRPr lang="en-US"/>
           </a:p>
@@ -2410,7 +2410,7 @@
           <a:p>
             <a:fld id="{FF930661-F093-4B49-A715-DBEF4BE1F4CF}" type="datetimeFigureOut">
               <a:rPr lang="en-US" smtClean="0"/>
-              <a:t>5/31/17</a:t>
+              <a:t>6/29/17</a:t>
             </a:fld>
             <a:endParaRPr lang="en-US"/>
           </a:p>
@@ -2662,7 +2662,7 @@
           <a:p>
             <a:fld id="{FF930661-F093-4B49-A715-DBEF4BE1F4CF}" type="datetimeFigureOut">
               <a:rPr lang="en-US" smtClean="0"/>
-              <a:t>5/31/17</a:t>
+              <a:t>6/29/17</a:t>
             </a:fld>
             <a:endParaRPr lang="en-US"/>
           </a:p>
@@ -2870,7 +2870,7 @@
           <a:p>
             <a:fld id="{FF930661-F093-4B49-A715-DBEF4BE1F4CF}" type="datetimeFigureOut">
               <a:rPr lang="en-US" smtClean="0"/>
-              <a:t>5/31/17</a:t>
+              <a:t>6/29/17</a:t>
             </a:fld>
             <a:endParaRPr lang="en-US"/>
           </a:p>
@@ -5865,6 +5865,106 @@
               <a:latin typeface="Helvetica" charset="0"/>
               <a:ea typeface="Helvetica" charset="0"/>
               <a:cs typeface="Helvetica" charset="0"/>
+            </a:endParaRPr>
+          </a:p>
+        </p:txBody>
+      </p:sp>
+      <p:sp>
+        <p:nvSpPr>
+          <p:cNvPr id="18" name="Rectangle 17"/>
+          <p:cNvSpPr/>
+          <p:nvPr/>
+        </p:nvSpPr>
+        <p:spPr>
+          <a:xfrm>
+            <a:off x="3964463" y="2122879"/>
+            <a:ext cx="4768990" cy="1186136"/>
+          </a:xfrm>
+          <a:prstGeom prst="rect">
+            <a:avLst/>
+          </a:prstGeom>
+          <a:solidFill>
+            <a:schemeClr val="bg1"/>
+          </a:solidFill>
+          <a:ln>
+            <a:noFill/>
+          </a:ln>
+        </p:spPr>
+        <p:style>
+          <a:lnRef idx="2">
+            <a:schemeClr val="accent1">
+              <a:shade val="50000"/>
+            </a:schemeClr>
+          </a:lnRef>
+          <a:fillRef idx="1">
+            <a:schemeClr val="accent1"/>
+          </a:fillRef>
+          <a:effectRef idx="0">
+            <a:schemeClr val="accent1"/>
+          </a:effectRef>
+          <a:fontRef idx="minor">
+            <a:schemeClr val="lt1"/>
+          </a:fontRef>
+        </p:style>
+        <p:txBody>
+          <a:bodyPr rtlCol="0" anchor="ctr"/>
+          <a:lstStyle/>
+          <a:p>
+            <a:pPr algn="ctr"/>
+            <a:r>
+              <a:rPr lang="en-US" smtClean="0"/>
+              <a:t>BaB</a:t>
+            </a:r>
+            <a:endParaRPr lang="en-US" dirty="0"/>
+          </a:p>
+        </p:txBody>
+      </p:sp>
+      <p:sp>
+        <p:nvSpPr>
+          <p:cNvPr id="19" name="TextBox 18"/>
+          <p:cNvSpPr txBox="1"/>
+          <p:nvPr/>
+        </p:nvSpPr>
+        <p:spPr>
+          <a:xfrm>
+            <a:off x="3787059" y="2266524"/>
+            <a:ext cx="5307716" cy="892552"/>
+          </a:xfrm>
+          <a:prstGeom prst="rect">
+            <a:avLst/>
+          </a:prstGeom>
+          <a:noFill/>
+        </p:spPr>
+        <p:txBody>
+          <a:bodyPr wrap="square" rtlCol="0">
+            <a:spAutoFit/>
+          </a:bodyPr>
+          <a:lstStyle/>
+          <a:p>
+            <a:pPr algn="ctr"/>
+            <a:r>
+              <a:rPr lang="en-US" sz="2600" b="1" dirty="0" smtClean="0">
+                <a:solidFill>
+                  <a:srgbClr val="C00000"/>
+                </a:solidFill>
+              </a:rPr>
+              <a:t>You should have gathered</a:t>
+            </a:r>
+          </a:p>
+          <a:p>
+            <a:pPr algn="ctr"/>
+            <a:r>
+              <a:rPr lang="en-US" sz="2600" b="1" dirty="0" smtClean="0">
+                <a:solidFill>
+                  <a:srgbClr val="C00000"/>
+                </a:solidFill>
+              </a:rPr>
+              <a:t>more/less information!</a:t>
+            </a:r>
+            <a:endParaRPr lang="en-US" sz="2600" b="1" dirty="0">
+              <a:solidFill>
+                <a:srgbClr val="C00000"/>
+              </a:solidFill>
             </a:endParaRPr>
           </a:p>
         </p:txBody>

</xml_diff>

<commit_message>
instruction image for no message
</commit_message>
<xml_diff>
--- a/experiments/exp1/static/images/$0.01/task_images.pptx
+++ b/experiments/exp1/static/images/$0.01/task_images.pptx
@@ -5,7 +5,7 @@
     <p:sldMasterId id="2147483672" r:id="rId1"/>
   </p:sldMasterIdLst>
   <p:notesMasterIdLst>
-    <p:notesMasterId r:id="rId7"/>
+    <p:notesMasterId r:id="rId8"/>
   </p:notesMasterIdLst>
   <p:sldIdLst>
     <p:sldId id="256" r:id="rId2"/>
@@ -13,6 +13,7 @@
     <p:sldId id="258" r:id="rId4"/>
     <p:sldId id="261" r:id="rId5"/>
     <p:sldId id="262" r:id="rId6"/>
+    <p:sldId id="263" r:id="rId7"/>
   </p:sldIdLst>
   <p:sldSz cx="12857163" cy="8001000"/>
   <p:notesSz cx="6858000" cy="9144000"/>
@@ -201,7 +202,7 @@
           <a:p>
             <a:fld id="{BA5244EF-28E7-0A45-8901-03971ADBA9CA}" type="datetimeFigureOut">
               <a:rPr lang="en-US" smtClean="0"/>
-              <a:t>6/29/17</a:t>
+              <a:t>7/6/17</a:t>
             </a:fld>
             <a:endParaRPr lang="en-US"/>
           </a:p>
@@ -600,7 +601,7 @@
           <a:p>
             <a:fld id="{FF930661-F093-4B49-A715-DBEF4BE1F4CF}" type="datetimeFigureOut">
               <a:rPr lang="en-US" smtClean="0"/>
-              <a:t>6/29/17</a:t>
+              <a:t>7/6/17</a:t>
             </a:fld>
             <a:endParaRPr lang="en-US"/>
           </a:p>
@@ -765,7 +766,7 @@
           <a:p>
             <a:fld id="{FF930661-F093-4B49-A715-DBEF4BE1F4CF}" type="datetimeFigureOut">
               <a:rPr lang="en-US" smtClean="0"/>
-              <a:t>6/29/17</a:t>
+              <a:t>7/6/17</a:t>
             </a:fld>
             <a:endParaRPr lang="en-US"/>
           </a:p>
@@ -940,7 +941,7 @@
           <a:p>
             <a:fld id="{FF930661-F093-4B49-A715-DBEF4BE1F4CF}" type="datetimeFigureOut">
               <a:rPr lang="en-US" smtClean="0"/>
-              <a:t>6/29/17</a:t>
+              <a:t>7/6/17</a:t>
             </a:fld>
             <a:endParaRPr lang="en-US"/>
           </a:p>
@@ -1105,7 +1106,7 @@
           <a:p>
             <a:fld id="{FF930661-F093-4B49-A715-DBEF4BE1F4CF}" type="datetimeFigureOut">
               <a:rPr lang="en-US" smtClean="0"/>
-              <a:t>6/29/17</a:t>
+              <a:t>7/6/17</a:t>
             </a:fld>
             <a:endParaRPr lang="en-US"/>
           </a:p>
@@ -1346,7 +1347,7 @@
           <a:p>
             <a:fld id="{FF930661-F093-4B49-A715-DBEF4BE1F4CF}" type="datetimeFigureOut">
               <a:rPr lang="en-US" smtClean="0"/>
-              <a:t>6/29/17</a:t>
+              <a:t>7/6/17</a:t>
             </a:fld>
             <a:endParaRPr lang="en-US"/>
           </a:p>
@@ -1573,7 +1574,7 @@
           <a:p>
             <a:fld id="{FF930661-F093-4B49-A715-DBEF4BE1F4CF}" type="datetimeFigureOut">
               <a:rPr lang="en-US" smtClean="0"/>
-              <a:t>6/29/17</a:t>
+              <a:t>7/6/17</a:t>
             </a:fld>
             <a:endParaRPr lang="en-US"/>
           </a:p>
@@ -1935,7 +1936,7 @@
           <a:p>
             <a:fld id="{FF930661-F093-4B49-A715-DBEF4BE1F4CF}" type="datetimeFigureOut">
               <a:rPr lang="en-US" smtClean="0"/>
-              <a:t>6/29/17</a:t>
+              <a:t>7/6/17</a:t>
             </a:fld>
             <a:endParaRPr lang="en-US"/>
           </a:p>
@@ -2048,7 +2049,7 @@
           <a:p>
             <a:fld id="{FF930661-F093-4B49-A715-DBEF4BE1F4CF}" type="datetimeFigureOut">
               <a:rPr lang="en-US" smtClean="0"/>
-              <a:t>6/29/17</a:t>
+              <a:t>7/6/17</a:t>
             </a:fld>
             <a:endParaRPr lang="en-US"/>
           </a:p>
@@ -2138,7 +2139,7 @@
           <a:p>
             <a:fld id="{FF930661-F093-4B49-A715-DBEF4BE1F4CF}" type="datetimeFigureOut">
               <a:rPr lang="en-US" smtClean="0"/>
-              <a:t>6/29/17</a:t>
+              <a:t>7/6/17</a:t>
             </a:fld>
             <a:endParaRPr lang="en-US"/>
           </a:p>
@@ -2410,7 +2411,7 @@
           <a:p>
             <a:fld id="{FF930661-F093-4B49-A715-DBEF4BE1F4CF}" type="datetimeFigureOut">
               <a:rPr lang="en-US" smtClean="0"/>
-              <a:t>6/29/17</a:t>
+              <a:t>7/6/17</a:t>
             </a:fld>
             <a:endParaRPr lang="en-US"/>
           </a:p>
@@ -2662,7 +2663,7 @@
           <a:p>
             <a:fld id="{FF930661-F093-4B49-A715-DBEF4BE1F4CF}" type="datetimeFigureOut">
               <a:rPr lang="en-US" smtClean="0"/>
-              <a:t>6/29/17</a:t>
+              <a:t>7/6/17</a:t>
             </a:fld>
             <a:endParaRPr lang="en-US"/>
           </a:p>
@@ -2870,7 +2871,7 @@
           <a:p>
             <a:fld id="{FF930661-F093-4B49-A715-DBEF4BE1F4CF}" type="datetimeFigureOut">
               <a:rPr lang="en-US" smtClean="0"/>
-              <a:t>6/29/17</a:t>
+              <a:t>7/6/17</a:t>
             </a:fld>
             <a:endParaRPr lang="en-US"/>
           </a:p>
@@ -6710,6 +6711,708 @@
     <p:extLst>
       <p:ext uri="{BB962C8B-B14F-4D97-AF65-F5344CB8AC3E}">
         <p14:creationId xmlns:p14="http://schemas.microsoft.com/office/powerpoint/2010/main" val="1225682558"/>
+      </p:ext>
+    </p:extLst>
+  </p:cSld>
+  <p:clrMapOvr>
+    <a:masterClrMapping/>
+  </p:clrMapOvr>
+  <p:timing>
+    <p:tnLst>
+      <p:par>
+        <p:cTn id="1" dur="indefinite" restart="never" nodeType="tmRoot"/>
+      </p:par>
+    </p:tnLst>
+  </p:timing>
+</p:sld>
+</file>
+
+<file path=ppt/slides/slide6.xml><?xml version="1.0" encoding="utf-8"?>
+<p:sld xmlns:a="http://schemas.openxmlformats.org/drawingml/2006/main" xmlns:r="http://schemas.openxmlformats.org/officeDocument/2006/relationships" xmlns:p="http://schemas.openxmlformats.org/presentationml/2006/main">
+  <p:cSld>
+    <p:spTree>
+      <p:nvGrpSpPr>
+        <p:cNvPr id="1" name=""/>
+        <p:cNvGrpSpPr/>
+        <p:nvPr/>
+      </p:nvGrpSpPr>
+      <p:grpSpPr>
+        <a:xfrm>
+          <a:off x="0" y="0"/>
+          <a:ext cx="0" cy="0"/>
+          <a:chOff x="0" y="0"/>
+          <a:chExt cx="0" cy="0"/>
+        </a:xfrm>
+      </p:grpSpPr>
+      <p:pic>
+        <p:nvPicPr>
+          <p:cNvPr id="5" name="Picture 4"/>
+          <p:cNvPicPr>
+            <a:picLocks noChangeAspect="1"/>
+          </p:cNvPicPr>
+          <p:nvPr/>
+        </p:nvPicPr>
+        <p:blipFill>
+          <a:blip r:embed="rId2">
+            <a:extLst>
+              <a:ext uri="{28A0092B-C50C-407E-A947-70E740481C1C}">
+                <a14:useLocalDpi xmlns:a14="http://schemas.microsoft.com/office/drawing/2010/main" val="0"/>
+              </a:ext>
+            </a:extLst>
+          </a:blip>
+          <a:stretch>
+            <a:fillRect/>
+          </a:stretch>
+        </p:blipFill>
+        <p:spPr>
+          <a:xfrm>
+            <a:off x="-4333" y="-5400"/>
+            <a:ext cx="12852400" cy="8001000"/>
+          </a:xfrm>
+          <a:prstGeom prst="rect">
+            <a:avLst/>
+          </a:prstGeom>
+        </p:spPr>
+      </p:pic>
+      <p:sp>
+        <p:nvSpPr>
+          <p:cNvPr id="4" name="Rectangle 3"/>
+          <p:cNvSpPr/>
+          <p:nvPr/>
+        </p:nvSpPr>
+        <p:spPr>
+          <a:xfrm>
+            <a:off x="5666793" y="-571597"/>
+            <a:ext cx="2153812" cy="1186136"/>
+          </a:xfrm>
+          <a:prstGeom prst="rect">
+            <a:avLst/>
+          </a:prstGeom>
+          <a:solidFill>
+            <a:schemeClr val="bg1"/>
+          </a:solidFill>
+          <a:ln>
+            <a:noFill/>
+          </a:ln>
+        </p:spPr>
+        <p:style>
+          <a:lnRef idx="2">
+            <a:schemeClr val="accent1">
+              <a:shade val="50000"/>
+            </a:schemeClr>
+          </a:lnRef>
+          <a:fillRef idx="1">
+            <a:schemeClr val="accent1"/>
+          </a:fillRef>
+          <a:effectRef idx="0">
+            <a:schemeClr val="accent1"/>
+          </a:effectRef>
+          <a:fontRef idx="minor">
+            <a:schemeClr val="lt1"/>
+          </a:fontRef>
+        </p:style>
+        <p:txBody>
+          <a:bodyPr rtlCol="0" anchor="ctr"/>
+          <a:lstStyle/>
+          <a:p>
+            <a:pPr algn="ctr"/>
+            <a:endParaRPr lang="en-US"/>
+          </a:p>
+        </p:txBody>
+      </p:sp>
+      <p:sp>
+        <p:nvSpPr>
+          <p:cNvPr id="7" name="Rectangle 6"/>
+          <p:cNvSpPr/>
+          <p:nvPr/>
+        </p:nvSpPr>
+        <p:spPr>
+          <a:xfrm>
+            <a:off x="-162506" y="-376905"/>
+            <a:ext cx="2153812" cy="1186136"/>
+          </a:xfrm>
+          <a:prstGeom prst="rect">
+            <a:avLst/>
+          </a:prstGeom>
+          <a:solidFill>
+            <a:schemeClr val="bg1"/>
+          </a:solidFill>
+          <a:ln>
+            <a:noFill/>
+          </a:ln>
+        </p:spPr>
+        <p:style>
+          <a:lnRef idx="2">
+            <a:schemeClr val="accent1">
+              <a:shade val="50000"/>
+            </a:schemeClr>
+          </a:lnRef>
+          <a:fillRef idx="1">
+            <a:schemeClr val="accent1"/>
+          </a:fillRef>
+          <a:effectRef idx="0">
+            <a:schemeClr val="accent1"/>
+          </a:effectRef>
+          <a:fontRef idx="minor">
+            <a:schemeClr val="lt1"/>
+          </a:fontRef>
+        </p:style>
+        <p:txBody>
+          <a:bodyPr rtlCol="0" anchor="ctr"/>
+          <a:lstStyle/>
+          <a:p>
+            <a:pPr algn="ctr"/>
+            <a:endParaRPr lang="en-US"/>
+          </a:p>
+        </p:txBody>
+      </p:sp>
+      <p:pic>
+        <p:nvPicPr>
+          <p:cNvPr id="2" name="Picture 1"/>
+          <p:cNvPicPr>
+            <a:picLocks noChangeAspect="1"/>
+          </p:cNvPicPr>
+          <p:nvPr/>
+        </p:nvPicPr>
+        <p:blipFill rotWithShape="1">
+          <a:blip r:embed="rId3">
+            <a:extLst>
+              <a:ext uri="{28A0092B-C50C-407E-A947-70E740481C1C}">
+                <a14:useLocalDpi xmlns:a14="http://schemas.microsoft.com/office/drawing/2010/main" val="0"/>
+              </a:ext>
+            </a:extLst>
+          </a:blip>
+          <a:srcRect l="21698" t="30001" r="50397" b="50714"/>
+          <a:stretch/>
+        </p:blipFill>
+        <p:spPr>
+          <a:xfrm>
+            <a:off x="-4770883" y="4527550"/>
+            <a:ext cx="3572467" cy="1543050"/>
+          </a:xfrm>
+          <a:prstGeom prst="rect">
+            <a:avLst/>
+          </a:prstGeom>
+        </p:spPr>
+      </p:pic>
+      <p:sp>
+        <p:nvSpPr>
+          <p:cNvPr id="12" name="Rectangle 11"/>
+          <p:cNvSpPr/>
+          <p:nvPr/>
+        </p:nvSpPr>
+        <p:spPr>
+          <a:xfrm>
+            <a:off x="-664733" y="7626825"/>
+            <a:ext cx="14173200" cy="838200"/>
+          </a:xfrm>
+          <a:prstGeom prst="rect">
+            <a:avLst/>
+          </a:prstGeom>
+          <a:solidFill>
+            <a:schemeClr val="bg1"/>
+          </a:solidFill>
+          <a:ln>
+            <a:noFill/>
+          </a:ln>
+        </p:spPr>
+        <p:style>
+          <a:lnRef idx="2">
+            <a:schemeClr val="accent1">
+              <a:shade val="50000"/>
+            </a:schemeClr>
+          </a:lnRef>
+          <a:fillRef idx="1">
+            <a:schemeClr val="accent1"/>
+          </a:fillRef>
+          <a:effectRef idx="0">
+            <a:schemeClr val="accent1"/>
+          </a:effectRef>
+          <a:fontRef idx="minor">
+            <a:schemeClr val="lt1"/>
+          </a:fontRef>
+        </p:style>
+        <p:txBody>
+          <a:bodyPr rtlCol="0" anchor="ctr"/>
+          <a:lstStyle/>
+          <a:p>
+            <a:pPr algn="ctr"/>
+            <a:endParaRPr lang="en-US"/>
+          </a:p>
+        </p:txBody>
+      </p:sp>
+      <p:pic>
+        <p:nvPicPr>
+          <p:cNvPr id="13" name="Picture 12"/>
+          <p:cNvPicPr>
+            <a:picLocks noChangeAspect="1"/>
+          </p:cNvPicPr>
+          <p:nvPr/>
+        </p:nvPicPr>
+        <p:blipFill>
+          <a:blip r:embed="rId4">
+            <a:extLst>
+              <a:ext uri="{28A0092B-C50C-407E-A947-70E740481C1C}">
+                <a14:useLocalDpi xmlns:a14="http://schemas.microsoft.com/office/drawing/2010/main" val="0"/>
+              </a:ext>
+            </a:extLst>
+          </a:blip>
+          <a:stretch>
+            <a:fillRect/>
+          </a:stretch>
+        </p:blipFill>
+        <p:spPr>
+          <a:xfrm>
+            <a:off x="4618467" y="7633175"/>
+            <a:ext cx="3606800" cy="482600"/>
+          </a:xfrm>
+          <a:prstGeom prst="rect">
+            <a:avLst/>
+          </a:prstGeom>
+        </p:spPr>
+      </p:pic>
+      <p:pic>
+        <p:nvPicPr>
+          <p:cNvPr id="14" name="Picture 13"/>
+          <p:cNvPicPr>
+            <a:picLocks noChangeAspect="1"/>
+          </p:cNvPicPr>
+          <p:nvPr/>
+        </p:nvPicPr>
+        <p:blipFill>
+          <a:blip r:embed="rId5">
+            <a:extLst>
+              <a:ext uri="{28A0092B-C50C-407E-A947-70E740481C1C}">
+                <a14:useLocalDpi xmlns:a14="http://schemas.microsoft.com/office/drawing/2010/main" val="0"/>
+              </a:ext>
+            </a:extLst>
+          </a:blip>
+          <a:stretch>
+            <a:fillRect/>
+          </a:stretch>
+        </p:blipFill>
+        <p:spPr>
+          <a:xfrm>
+            <a:off x="5956300" y="3651250"/>
+            <a:ext cx="939800" cy="876300"/>
+          </a:xfrm>
+          <a:prstGeom prst="rect">
+            <a:avLst/>
+          </a:prstGeom>
+        </p:spPr>
+      </p:pic>
+      <p:sp>
+        <p:nvSpPr>
+          <p:cNvPr id="15" name="Rectangle 14"/>
+          <p:cNvSpPr/>
+          <p:nvPr/>
+        </p:nvSpPr>
+        <p:spPr>
+          <a:xfrm>
+            <a:off x="5956299" y="3695911"/>
+            <a:ext cx="901701" cy="723689"/>
+          </a:xfrm>
+          <a:prstGeom prst="rect">
+            <a:avLst/>
+          </a:prstGeom>
+          <a:solidFill>
+            <a:schemeClr val="bg1"/>
+          </a:solidFill>
+          <a:ln>
+            <a:noFill/>
+          </a:ln>
+        </p:spPr>
+        <p:style>
+          <a:lnRef idx="2">
+            <a:schemeClr val="accent1">
+              <a:shade val="50000"/>
+            </a:schemeClr>
+          </a:lnRef>
+          <a:fillRef idx="1">
+            <a:schemeClr val="accent1"/>
+          </a:fillRef>
+          <a:effectRef idx="0">
+            <a:schemeClr val="accent1"/>
+          </a:effectRef>
+          <a:fontRef idx="minor">
+            <a:schemeClr val="lt1"/>
+          </a:fontRef>
+        </p:style>
+        <p:txBody>
+          <a:bodyPr rtlCol="0" anchor="ctr"/>
+          <a:lstStyle/>
+          <a:p>
+            <a:pPr algn="ctr"/>
+            <a:endParaRPr lang="en-US"/>
+          </a:p>
+        </p:txBody>
+      </p:sp>
+      <p:pic>
+        <p:nvPicPr>
+          <p:cNvPr id="3" name="Picture 2"/>
+          <p:cNvPicPr>
+            <a:picLocks noChangeAspect="1"/>
+          </p:cNvPicPr>
+          <p:nvPr/>
+        </p:nvPicPr>
+        <p:blipFill rotWithShape="1">
+          <a:blip r:embed="rId6">
+            <a:extLst>
+              <a:ext uri="{28A0092B-C50C-407E-A947-70E740481C1C}">
+                <a14:useLocalDpi xmlns:a14="http://schemas.microsoft.com/office/drawing/2010/main" val="0"/>
+              </a:ext>
+            </a:extLst>
+          </a:blip>
+          <a:srcRect l="21568" t="30473" r="50455" b="50586"/>
+          <a:stretch/>
+        </p:blipFill>
+        <p:spPr>
+          <a:xfrm>
+            <a:off x="-4906533" y="2135829"/>
+            <a:ext cx="3581400" cy="1515421"/>
+          </a:xfrm>
+          <a:prstGeom prst="rect">
+            <a:avLst/>
+          </a:prstGeom>
+        </p:spPr>
+      </p:pic>
+      <p:sp>
+        <p:nvSpPr>
+          <p:cNvPr id="8" name="Rectangle 7"/>
+          <p:cNvSpPr/>
+          <p:nvPr/>
+        </p:nvSpPr>
+        <p:spPr>
+          <a:xfrm>
+            <a:off x="-627642" y="-480793"/>
+            <a:ext cx="14742683" cy="9644360"/>
+          </a:xfrm>
+          <a:prstGeom prst="rect">
+            <a:avLst/>
+          </a:prstGeom>
+          <a:solidFill>
+            <a:schemeClr val="tx1">
+              <a:lumMod val="75000"/>
+              <a:lumOff val="25000"/>
+              <a:alpha val="52000"/>
+            </a:schemeClr>
+          </a:solidFill>
+          <a:ln>
+            <a:noFill/>
+          </a:ln>
+        </p:spPr>
+        <p:style>
+          <a:lnRef idx="2">
+            <a:schemeClr val="accent1">
+              <a:shade val="50000"/>
+            </a:schemeClr>
+          </a:lnRef>
+          <a:fillRef idx="1">
+            <a:schemeClr val="accent1"/>
+          </a:fillRef>
+          <a:effectRef idx="0">
+            <a:schemeClr val="accent1"/>
+          </a:effectRef>
+          <a:fontRef idx="minor">
+            <a:schemeClr val="lt1"/>
+          </a:fontRef>
+        </p:style>
+        <p:txBody>
+          <a:bodyPr rtlCol="0" anchor="ctr"/>
+          <a:lstStyle/>
+          <a:p>
+            <a:pPr algn="ctr"/>
+            <a:endParaRPr lang="en-US"/>
+          </a:p>
+        </p:txBody>
+      </p:sp>
+      <p:pic>
+        <p:nvPicPr>
+          <p:cNvPr id="10" name="Picture 9"/>
+          <p:cNvPicPr>
+            <a:picLocks noChangeAspect="1"/>
+          </p:cNvPicPr>
+          <p:nvPr/>
+        </p:nvPicPr>
+        <p:blipFill>
+          <a:blip r:embed="rId7">
+            <a:extLst>
+              <a:ext uri="{28A0092B-C50C-407E-A947-70E740481C1C}">
+                <a14:useLocalDpi xmlns:a14="http://schemas.microsoft.com/office/drawing/2010/main" val="0"/>
+              </a:ext>
+            </a:extLst>
+          </a:blip>
+          <a:stretch>
+            <a:fillRect/>
+          </a:stretch>
+        </p:blipFill>
+        <p:spPr>
+          <a:xfrm>
+            <a:off x="-7070874" y="-1186500"/>
+            <a:ext cx="5308600" cy="2362200"/>
+          </a:xfrm>
+          <a:prstGeom prst="rect">
+            <a:avLst/>
+          </a:prstGeom>
+        </p:spPr>
+      </p:pic>
+      <p:pic>
+        <p:nvPicPr>
+          <p:cNvPr id="11" name="Picture 10"/>
+          <p:cNvPicPr>
+            <a:picLocks noChangeAspect="1"/>
+          </p:cNvPicPr>
+          <p:nvPr/>
+        </p:nvPicPr>
+        <p:blipFill>
+          <a:blip r:embed="rId8">
+            <a:extLst>
+              <a:ext uri="{28A0092B-C50C-407E-A947-70E740481C1C}">
+                <a14:useLocalDpi xmlns:a14="http://schemas.microsoft.com/office/drawing/2010/main" val="0"/>
+              </a:ext>
+            </a:extLst>
+          </a:blip>
+          <a:stretch>
+            <a:fillRect/>
+          </a:stretch>
+        </p:blipFill>
+        <p:spPr>
+          <a:xfrm>
+            <a:off x="14611633" y="4112270"/>
+            <a:ext cx="5359400" cy="3086100"/>
+          </a:xfrm>
+          <a:prstGeom prst="rect">
+            <a:avLst/>
+          </a:prstGeom>
+        </p:spPr>
+      </p:pic>
+      <p:pic>
+        <p:nvPicPr>
+          <p:cNvPr id="16" name="Picture 15"/>
+          <p:cNvPicPr>
+            <a:picLocks noChangeAspect="1"/>
+          </p:cNvPicPr>
+          <p:nvPr/>
+        </p:nvPicPr>
+        <p:blipFill rotWithShape="1">
+          <a:blip r:embed="rId9">
+            <a:extLst>
+              <a:ext uri="{28A0092B-C50C-407E-A947-70E740481C1C}">
+                <a14:useLocalDpi xmlns:a14="http://schemas.microsoft.com/office/drawing/2010/main" val="0"/>
+              </a:ext>
+            </a:extLst>
+          </a:blip>
+          <a:srcRect l="370" r="358"/>
+          <a:stretch/>
+        </p:blipFill>
+        <p:spPr>
+          <a:xfrm>
+            <a:off x="3787059" y="1906663"/>
+            <a:ext cx="5307716" cy="2781300"/>
+          </a:xfrm>
+          <a:prstGeom prst="rect">
+            <a:avLst/>
+          </a:prstGeom>
+        </p:spPr>
+      </p:pic>
+      <p:sp>
+        <p:nvSpPr>
+          <p:cNvPr id="17" name="TextBox 16"/>
+          <p:cNvSpPr txBox="1"/>
+          <p:nvPr/>
+        </p:nvSpPr>
+        <p:spPr>
+          <a:xfrm>
+            <a:off x="212563" y="131235"/>
+            <a:ext cx="2343911" cy="523220"/>
+          </a:xfrm>
+          <a:prstGeom prst="rect">
+            <a:avLst/>
+          </a:prstGeom>
+          <a:noFill/>
+        </p:spPr>
+        <p:txBody>
+          <a:bodyPr wrap="none" rtlCol="0">
+            <a:spAutoFit/>
+          </a:bodyPr>
+          <a:lstStyle/>
+          <a:p>
+            <a:r>
+              <a:rPr lang="en-US" sz="2800" dirty="0" smtClean="0">
+                <a:latin typeface="Helvetica" charset="0"/>
+                <a:ea typeface="Helvetica" charset="0"/>
+                <a:cs typeface="Helvetica" charset="0"/>
+              </a:rPr>
+              <a:t>Round: 1 / 12</a:t>
+            </a:r>
+            <a:endParaRPr lang="en-US" sz="2800" dirty="0">
+              <a:latin typeface="Helvetica" charset="0"/>
+              <a:ea typeface="Helvetica" charset="0"/>
+              <a:cs typeface="Helvetica" charset="0"/>
+            </a:endParaRPr>
+          </a:p>
+        </p:txBody>
+      </p:sp>
+      <p:sp>
+        <p:nvSpPr>
+          <p:cNvPr id="23" name="TextBox 22"/>
+          <p:cNvSpPr txBox="1"/>
+          <p:nvPr/>
+        </p:nvSpPr>
+        <p:spPr>
+          <a:xfrm>
+            <a:off x="5618409" y="127611"/>
+            <a:ext cx="1436932" cy="523220"/>
+          </a:xfrm>
+          <a:prstGeom prst="rect">
+            <a:avLst/>
+          </a:prstGeom>
+          <a:noFill/>
+        </p:spPr>
+        <p:txBody>
+          <a:bodyPr wrap="none" rtlCol="0">
+            <a:spAutoFit/>
+          </a:bodyPr>
+          <a:lstStyle/>
+          <a:p>
+            <a:r>
+              <a:rPr lang="en-US" sz="2800" b="1" dirty="0" smtClean="0">
+                <a:latin typeface="Helvetica" charset="0"/>
+                <a:ea typeface="Helvetica" charset="0"/>
+                <a:cs typeface="Helvetica" charset="0"/>
+              </a:rPr>
+              <a:t>Time: </a:t>
+            </a:r>
+            <a:r>
+              <a:rPr lang="en-US" sz="2800" b="1" dirty="0" smtClean="0">
+                <a:solidFill>
+                  <a:schemeClr val="accent6">
+                    <a:lumMod val="75000"/>
+                  </a:schemeClr>
+                </a:solidFill>
+                <a:latin typeface="Helvetica" charset="0"/>
+                <a:ea typeface="Helvetica" charset="0"/>
+                <a:cs typeface="Helvetica" charset="0"/>
+              </a:rPr>
+              <a:t>0</a:t>
+            </a:r>
+            <a:endParaRPr lang="en-US" sz="2800" b="1" dirty="0">
+              <a:solidFill>
+                <a:schemeClr val="accent6">
+                  <a:lumMod val="75000"/>
+                </a:schemeClr>
+              </a:solidFill>
+              <a:latin typeface="Helvetica" charset="0"/>
+              <a:ea typeface="Helvetica" charset="0"/>
+              <a:cs typeface="Helvetica" charset="0"/>
+            </a:endParaRPr>
+          </a:p>
+        </p:txBody>
+      </p:sp>
+      <p:sp>
+        <p:nvSpPr>
+          <p:cNvPr id="18" name="Rectangle 17"/>
+          <p:cNvSpPr/>
+          <p:nvPr/>
+        </p:nvSpPr>
+        <p:spPr>
+          <a:xfrm>
+            <a:off x="3964463" y="2122879"/>
+            <a:ext cx="4768990" cy="1186136"/>
+          </a:xfrm>
+          <a:prstGeom prst="rect">
+            <a:avLst/>
+          </a:prstGeom>
+          <a:solidFill>
+            <a:schemeClr val="bg1"/>
+          </a:solidFill>
+          <a:ln>
+            <a:noFill/>
+          </a:ln>
+        </p:spPr>
+        <p:style>
+          <a:lnRef idx="2">
+            <a:schemeClr val="accent1">
+              <a:shade val="50000"/>
+            </a:schemeClr>
+          </a:lnRef>
+          <a:fillRef idx="1">
+            <a:schemeClr val="accent1"/>
+          </a:fillRef>
+          <a:effectRef idx="0">
+            <a:schemeClr val="accent1"/>
+          </a:effectRef>
+          <a:fontRef idx="minor">
+            <a:schemeClr val="lt1"/>
+          </a:fontRef>
+        </p:style>
+        <p:txBody>
+          <a:bodyPr rtlCol="0" anchor="ctr"/>
+          <a:lstStyle/>
+          <a:p>
+            <a:pPr algn="ctr"/>
+            <a:r>
+              <a:rPr lang="en-US" smtClean="0"/>
+              <a:t>BaB</a:t>
+            </a:r>
+            <a:endParaRPr lang="en-US" dirty="0"/>
+          </a:p>
+        </p:txBody>
+      </p:sp>
+      <p:sp>
+        <p:nvSpPr>
+          <p:cNvPr id="21" name="Rectangle 20"/>
+          <p:cNvSpPr/>
+          <p:nvPr/>
+        </p:nvSpPr>
+        <p:spPr>
+          <a:xfrm>
+            <a:off x="4037372" y="3672945"/>
+            <a:ext cx="4768990" cy="746655"/>
+          </a:xfrm>
+          <a:prstGeom prst="rect">
+            <a:avLst/>
+          </a:prstGeom>
+          <a:solidFill>
+            <a:schemeClr val="bg1"/>
+          </a:solidFill>
+          <a:ln>
+            <a:noFill/>
+          </a:ln>
+        </p:spPr>
+        <p:style>
+          <a:lnRef idx="2">
+            <a:schemeClr val="accent1">
+              <a:shade val="50000"/>
+            </a:schemeClr>
+          </a:lnRef>
+          <a:fillRef idx="1">
+            <a:schemeClr val="accent1"/>
+          </a:fillRef>
+          <a:effectRef idx="0">
+            <a:schemeClr val="accent1"/>
+          </a:effectRef>
+          <a:fontRef idx="minor">
+            <a:schemeClr val="lt1"/>
+          </a:fontRef>
+        </p:style>
+        <p:txBody>
+          <a:bodyPr rtlCol="0" anchor="ctr"/>
+          <a:lstStyle/>
+          <a:p>
+            <a:pPr algn="ctr"/>
+            <a:r>
+              <a:rPr lang="en-US" smtClean="0"/>
+              <a:t>BaB</a:t>
+            </a:r>
+            <a:endParaRPr lang="en-US" dirty="0"/>
+          </a:p>
+        </p:txBody>
+      </p:sp>
+    </p:spTree>
+    <p:extLst>
+      <p:ext uri="{BB962C8B-B14F-4D97-AF65-F5344CB8AC3E}">
+        <p14:creationId xmlns:p14="http://schemas.microsoft.com/office/powerpoint/2010/main" val="197495209"/>
       </p:ext>
     </p:extLst>
   </p:cSld>

</xml_diff>

<commit_message>
updated instructions for conditions in 1b and 1c
</commit_message>
<xml_diff>
--- a/experiments/exp1/static/images/$0.01/task_images.pptx
+++ b/experiments/exp1/static/images/$0.01/task_images.pptx
@@ -5,7 +5,7 @@
     <p:sldMasterId id="2147483672" r:id="rId1"/>
   </p:sldMasterIdLst>
   <p:notesMasterIdLst>
-    <p:notesMasterId r:id="rId8"/>
+    <p:notesMasterId r:id="rId10"/>
   </p:notesMasterIdLst>
   <p:sldIdLst>
     <p:sldId id="256" r:id="rId2"/>
@@ -14,6 +14,8 @@
     <p:sldId id="261" r:id="rId5"/>
     <p:sldId id="262" r:id="rId6"/>
     <p:sldId id="263" r:id="rId7"/>
+    <p:sldId id="264" r:id="rId8"/>
+    <p:sldId id="265" r:id="rId9"/>
   </p:sldIdLst>
   <p:sldSz cx="12857163" cy="8001000"/>
   <p:notesSz cx="6858000" cy="9144000"/>
@@ -202,7 +204,7 @@
           <a:p>
             <a:fld id="{BA5244EF-28E7-0A45-8901-03971ADBA9CA}" type="datetimeFigureOut">
               <a:rPr lang="en-US" smtClean="0"/>
-              <a:t>7/6/17</a:t>
+              <a:t>7/7/17</a:t>
             </a:fld>
             <a:endParaRPr lang="en-US"/>
           </a:p>
@@ -601,7 +603,7 @@
           <a:p>
             <a:fld id="{FF930661-F093-4B49-A715-DBEF4BE1F4CF}" type="datetimeFigureOut">
               <a:rPr lang="en-US" smtClean="0"/>
-              <a:t>7/6/17</a:t>
+              <a:t>7/7/17</a:t>
             </a:fld>
             <a:endParaRPr lang="en-US"/>
           </a:p>
@@ -766,7 +768,7 @@
           <a:p>
             <a:fld id="{FF930661-F093-4B49-A715-DBEF4BE1F4CF}" type="datetimeFigureOut">
               <a:rPr lang="en-US" smtClean="0"/>
-              <a:t>7/6/17</a:t>
+              <a:t>7/7/17</a:t>
             </a:fld>
             <a:endParaRPr lang="en-US"/>
           </a:p>
@@ -941,7 +943,7 @@
           <a:p>
             <a:fld id="{FF930661-F093-4B49-A715-DBEF4BE1F4CF}" type="datetimeFigureOut">
               <a:rPr lang="en-US" smtClean="0"/>
-              <a:t>7/6/17</a:t>
+              <a:t>7/7/17</a:t>
             </a:fld>
             <a:endParaRPr lang="en-US"/>
           </a:p>
@@ -1106,7 +1108,7 @@
           <a:p>
             <a:fld id="{FF930661-F093-4B49-A715-DBEF4BE1F4CF}" type="datetimeFigureOut">
               <a:rPr lang="en-US" smtClean="0"/>
-              <a:t>7/6/17</a:t>
+              <a:t>7/7/17</a:t>
             </a:fld>
             <a:endParaRPr lang="en-US"/>
           </a:p>
@@ -1347,7 +1349,7 @@
           <a:p>
             <a:fld id="{FF930661-F093-4B49-A715-DBEF4BE1F4CF}" type="datetimeFigureOut">
               <a:rPr lang="en-US" smtClean="0"/>
-              <a:t>7/6/17</a:t>
+              <a:t>7/7/17</a:t>
             </a:fld>
             <a:endParaRPr lang="en-US"/>
           </a:p>
@@ -1574,7 +1576,7 @@
           <a:p>
             <a:fld id="{FF930661-F093-4B49-A715-DBEF4BE1F4CF}" type="datetimeFigureOut">
               <a:rPr lang="en-US" smtClean="0"/>
-              <a:t>7/6/17</a:t>
+              <a:t>7/7/17</a:t>
             </a:fld>
             <a:endParaRPr lang="en-US"/>
           </a:p>
@@ -1936,7 +1938,7 @@
           <a:p>
             <a:fld id="{FF930661-F093-4B49-A715-DBEF4BE1F4CF}" type="datetimeFigureOut">
               <a:rPr lang="en-US" smtClean="0"/>
-              <a:t>7/6/17</a:t>
+              <a:t>7/7/17</a:t>
             </a:fld>
             <a:endParaRPr lang="en-US"/>
           </a:p>
@@ -2049,7 +2051,7 @@
           <a:p>
             <a:fld id="{FF930661-F093-4B49-A715-DBEF4BE1F4CF}" type="datetimeFigureOut">
               <a:rPr lang="en-US" smtClean="0"/>
-              <a:t>7/6/17</a:t>
+              <a:t>7/7/17</a:t>
             </a:fld>
             <a:endParaRPr lang="en-US"/>
           </a:p>
@@ -2139,7 +2141,7 @@
           <a:p>
             <a:fld id="{FF930661-F093-4B49-A715-DBEF4BE1F4CF}" type="datetimeFigureOut">
               <a:rPr lang="en-US" smtClean="0"/>
-              <a:t>7/6/17</a:t>
+              <a:t>7/7/17</a:t>
             </a:fld>
             <a:endParaRPr lang="en-US"/>
           </a:p>
@@ -2411,7 +2413,7 @@
           <a:p>
             <a:fld id="{FF930661-F093-4B49-A715-DBEF4BE1F4CF}" type="datetimeFigureOut">
               <a:rPr lang="en-US" smtClean="0"/>
-              <a:t>7/6/17</a:t>
+              <a:t>7/7/17</a:t>
             </a:fld>
             <a:endParaRPr lang="en-US"/>
           </a:p>
@@ -2663,7 +2665,7 @@
           <a:p>
             <a:fld id="{FF930661-F093-4B49-A715-DBEF4BE1F4CF}" type="datetimeFigureOut">
               <a:rPr lang="en-US" smtClean="0"/>
-              <a:t>7/6/17</a:t>
+              <a:t>7/7/17</a:t>
             </a:fld>
             <a:endParaRPr lang="en-US"/>
           </a:p>
@@ -2871,7 +2873,7 @@
           <a:p>
             <a:fld id="{FF930661-F093-4B49-A715-DBEF4BE1F4CF}" type="datetimeFigureOut">
               <a:rPr lang="en-US" smtClean="0"/>
-              <a:t>7/6/17</a:t>
+              <a:t>7/7/17</a:t>
             </a:fld>
             <a:endParaRPr lang="en-US"/>
           </a:p>
@@ -7413,6 +7415,1499 @@
     <p:extLst>
       <p:ext uri="{BB962C8B-B14F-4D97-AF65-F5344CB8AC3E}">
         <p14:creationId xmlns:p14="http://schemas.microsoft.com/office/powerpoint/2010/main" val="197495209"/>
+      </p:ext>
+    </p:extLst>
+  </p:cSld>
+  <p:clrMapOvr>
+    <a:masterClrMapping/>
+  </p:clrMapOvr>
+  <p:timing>
+    <p:tnLst>
+      <p:par>
+        <p:cTn id="1" dur="indefinite" restart="never" nodeType="tmRoot"/>
+      </p:par>
+    </p:tnLst>
+  </p:timing>
+</p:sld>
+</file>
+
+<file path=ppt/slides/slide7.xml><?xml version="1.0" encoding="utf-8"?>
+<p:sld xmlns:a="http://schemas.openxmlformats.org/drawingml/2006/main" xmlns:r="http://schemas.openxmlformats.org/officeDocument/2006/relationships" xmlns:p="http://schemas.openxmlformats.org/presentationml/2006/main">
+  <p:cSld>
+    <p:spTree>
+      <p:nvGrpSpPr>
+        <p:cNvPr id="1" name=""/>
+        <p:cNvGrpSpPr/>
+        <p:nvPr/>
+      </p:nvGrpSpPr>
+      <p:grpSpPr>
+        <a:xfrm>
+          <a:off x="0" y="0"/>
+          <a:ext cx="0" cy="0"/>
+          <a:chOff x="0" y="0"/>
+          <a:chExt cx="0" cy="0"/>
+        </a:xfrm>
+      </p:grpSpPr>
+      <p:pic>
+        <p:nvPicPr>
+          <p:cNvPr id="5" name="Picture 4"/>
+          <p:cNvPicPr>
+            <a:picLocks noChangeAspect="1"/>
+          </p:cNvPicPr>
+          <p:nvPr/>
+        </p:nvPicPr>
+        <p:blipFill>
+          <a:blip r:embed="rId2">
+            <a:extLst>
+              <a:ext uri="{28A0092B-C50C-407E-A947-70E740481C1C}">
+                <a14:useLocalDpi xmlns:a14="http://schemas.microsoft.com/office/drawing/2010/main" val="0"/>
+              </a:ext>
+            </a:extLst>
+          </a:blip>
+          <a:stretch>
+            <a:fillRect/>
+          </a:stretch>
+        </p:blipFill>
+        <p:spPr>
+          <a:xfrm>
+            <a:off x="-4333" y="-5400"/>
+            <a:ext cx="12852400" cy="8001000"/>
+          </a:xfrm>
+          <a:prstGeom prst="rect">
+            <a:avLst/>
+          </a:prstGeom>
+        </p:spPr>
+      </p:pic>
+      <p:sp>
+        <p:nvSpPr>
+          <p:cNvPr id="4" name="Rectangle 3"/>
+          <p:cNvSpPr/>
+          <p:nvPr/>
+        </p:nvSpPr>
+        <p:spPr>
+          <a:xfrm>
+            <a:off x="5666793" y="-571597"/>
+            <a:ext cx="2153812" cy="1186136"/>
+          </a:xfrm>
+          <a:prstGeom prst="rect">
+            <a:avLst/>
+          </a:prstGeom>
+          <a:solidFill>
+            <a:schemeClr val="bg1"/>
+          </a:solidFill>
+          <a:ln>
+            <a:noFill/>
+          </a:ln>
+        </p:spPr>
+        <p:style>
+          <a:lnRef idx="2">
+            <a:schemeClr val="accent1">
+              <a:shade val="50000"/>
+            </a:schemeClr>
+          </a:lnRef>
+          <a:fillRef idx="1">
+            <a:schemeClr val="accent1"/>
+          </a:fillRef>
+          <a:effectRef idx="0">
+            <a:schemeClr val="accent1"/>
+          </a:effectRef>
+          <a:fontRef idx="minor">
+            <a:schemeClr val="lt1"/>
+          </a:fontRef>
+        </p:style>
+        <p:txBody>
+          <a:bodyPr rtlCol="0" anchor="ctr"/>
+          <a:lstStyle/>
+          <a:p>
+            <a:pPr algn="ctr"/>
+            <a:endParaRPr lang="en-US"/>
+          </a:p>
+        </p:txBody>
+      </p:sp>
+      <p:sp>
+        <p:nvSpPr>
+          <p:cNvPr id="7" name="Rectangle 6"/>
+          <p:cNvSpPr/>
+          <p:nvPr/>
+        </p:nvSpPr>
+        <p:spPr>
+          <a:xfrm>
+            <a:off x="-162506" y="-376905"/>
+            <a:ext cx="2153812" cy="1186136"/>
+          </a:xfrm>
+          <a:prstGeom prst="rect">
+            <a:avLst/>
+          </a:prstGeom>
+          <a:solidFill>
+            <a:schemeClr val="bg1"/>
+          </a:solidFill>
+          <a:ln>
+            <a:noFill/>
+          </a:ln>
+        </p:spPr>
+        <p:style>
+          <a:lnRef idx="2">
+            <a:schemeClr val="accent1">
+              <a:shade val="50000"/>
+            </a:schemeClr>
+          </a:lnRef>
+          <a:fillRef idx="1">
+            <a:schemeClr val="accent1"/>
+          </a:fillRef>
+          <a:effectRef idx="0">
+            <a:schemeClr val="accent1"/>
+          </a:effectRef>
+          <a:fontRef idx="minor">
+            <a:schemeClr val="lt1"/>
+          </a:fontRef>
+        </p:style>
+        <p:txBody>
+          <a:bodyPr rtlCol="0" anchor="ctr"/>
+          <a:lstStyle/>
+          <a:p>
+            <a:pPr algn="ctr"/>
+            <a:endParaRPr lang="en-US"/>
+          </a:p>
+        </p:txBody>
+      </p:sp>
+      <p:pic>
+        <p:nvPicPr>
+          <p:cNvPr id="2" name="Picture 1"/>
+          <p:cNvPicPr>
+            <a:picLocks noChangeAspect="1"/>
+          </p:cNvPicPr>
+          <p:nvPr/>
+        </p:nvPicPr>
+        <p:blipFill rotWithShape="1">
+          <a:blip r:embed="rId3">
+            <a:extLst>
+              <a:ext uri="{28A0092B-C50C-407E-A947-70E740481C1C}">
+                <a14:useLocalDpi xmlns:a14="http://schemas.microsoft.com/office/drawing/2010/main" val="0"/>
+              </a:ext>
+            </a:extLst>
+          </a:blip>
+          <a:srcRect l="21698" t="30001" r="50397" b="50714"/>
+          <a:stretch/>
+        </p:blipFill>
+        <p:spPr>
+          <a:xfrm>
+            <a:off x="-4770883" y="4527550"/>
+            <a:ext cx="3572467" cy="1543050"/>
+          </a:xfrm>
+          <a:prstGeom prst="rect">
+            <a:avLst/>
+          </a:prstGeom>
+        </p:spPr>
+      </p:pic>
+      <p:sp>
+        <p:nvSpPr>
+          <p:cNvPr id="12" name="Rectangle 11"/>
+          <p:cNvSpPr/>
+          <p:nvPr/>
+        </p:nvSpPr>
+        <p:spPr>
+          <a:xfrm>
+            <a:off x="-664733" y="7626825"/>
+            <a:ext cx="14173200" cy="838200"/>
+          </a:xfrm>
+          <a:prstGeom prst="rect">
+            <a:avLst/>
+          </a:prstGeom>
+          <a:solidFill>
+            <a:schemeClr val="bg1"/>
+          </a:solidFill>
+          <a:ln>
+            <a:noFill/>
+          </a:ln>
+        </p:spPr>
+        <p:style>
+          <a:lnRef idx="2">
+            <a:schemeClr val="accent1">
+              <a:shade val="50000"/>
+            </a:schemeClr>
+          </a:lnRef>
+          <a:fillRef idx="1">
+            <a:schemeClr val="accent1"/>
+          </a:fillRef>
+          <a:effectRef idx="0">
+            <a:schemeClr val="accent1"/>
+          </a:effectRef>
+          <a:fontRef idx="minor">
+            <a:schemeClr val="lt1"/>
+          </a:fontRef>
+        </p:style>
+        <p:txBody>
+          <a:bodyPr rtlCol="0" anchor="ctr"/>
+          <a:lstStyle/>
+          <a:p>
+            <a:pPr algn="ctr"/>
+            <a:endParaRPr lang="en-US"/>
+          </a:p>
+        </p:txBody>
+      </p:sp>
+      <p:pic>
+        <p:nvPicPr>
+          <p:cNvPr id="13" name="Picture 12"/>
+          <p:cNvPicPr>
+            <a:picLocks noChangeAspect="1"/>
+          </p:cNvPicPr>
+          <p:nvPr/>
+        </p:nvPicPr>
+        <p:blipFill>
+          <a:blip r:embed="rId4">
+            <a:extLst>
+              <a:ext uri="{28A0092B-C50C-407E-A947-70E740481C1C}">
+                <a14:useLocalDpi xmlns:a14="http://schemas.microsoft.com/office/drawing/2010/main" val="0"/>
+              </a:ext>
+            </a:extLst>
+          </a:blip>
+          <a:stretch>
+            <a:fillRect/>
+          </a:stretch>
+        </p:blipFill>
+        <p:spPr>
+          <a:xfrm>
+            <a:off x="4618467" y="7633175"/>
+            <a:ext cx="3606800" cy="482600"/>
+          </a:xfrm>
+          <a:prstGeom prst="rect">
+            <a:avLst/>
+          </a:prstGeom>
+        </p:spPr>
+      </p:pic>
+      <p:pic>
+        <p:nvPicPr>
+          <p:cNvPr id="14" name="Picture 13"/>
+          <p:cNvPicPr>
+            <a:picLocks noChangeAspect="1"/>
+          </p:cNvPicPr>
+          <p:nvPr/>
+        </p:nvPicPr>
+        <p:blipFill>
+          <a:blip r:embed="rId5">
+            <a:extLst>
+              <a:ext uri="{28A0092B-C50C-407E-A947-70E740481C1C}">
+                <a14:useLocalDpi xmlns:a14="http://schemas.microsoft.com/office/drawing/2010/main" val="0"/>
+              </a:ext>
+            </a:extLst>
+          </a:blip>
+          <a:stretch>
+            <a:fillRect/>
+          </a:stretch>
+        </p:blipFill>
+        <p:spPr>
+          <a:xfrm>
+            <a:off x="5956300" y="3651250"/>
+            <a:ext cx="939800" cy="876300"/>
+          </a:xfrm>
+          <a:prstGeom prst="rect">
+            <a:avLst/>
+          </a:prstGeom>
+        </p:spPr>
+      </p:pic>
+      <p:sp>
+        <p:nvSpPr>
+          <p:cNvPr id="15" name="Rectangle 14"/>
+          <p:cNvSpPr/>
+          <p:nvPr/>
+        </p:nvSpPr>
+        <p:spPr>
+          <a:xfrm>
+            <a:off x="5956299" y="3695911"/>
+            <a:ext cx="901701" cy="723689"/>
+          </a:xfrm>
+          <a:prstGeom prst="rect">
+            <a:avLst/>
+          </a:prstGeom>
+          <a:solidFill>
+            <a:schemeClr val="bg1"/>
+          </a:solidFill>
+          <a:ln>
+            <a:noFill/>
+          </a:ln>
+        </p:spPr>
+        <p:style>
+          <a:lnRef idx="2">
+            <a:schemeClr val="accent1">
+              <a:shade val="50000"/>
+            </a:schemeClr>
+          </a:lnRef>
+          <a:fillRef idx="1">
+            <a:schemeClr val="accent1"/>
+          </a:fillRef>
+          <a:effectRef idx="0">
+            <a:schemeClr val="accent1"/>
+          </a:effectRef>
+          <a:fontRef idx="minor">
+            <a:schemeClr val="lt1"/>
+          </a:fontRef>
+        </p:style>
+        <p:txBody>
+          <a:bodyPr rtlCol="0" anchor="ctr"/>
+          <a:lstStyle/>
+          <a:p>
+            <a:pPr algn="ctr"/>
+            <a:endParaRPr lang="en-US"/>
+          </a:p>
+        </p:txBody>
+      </p:sp>
+      <p:pic>
+        <p:nvPicPr>
+          <p:cNvPr id="3" name="Picture 2"/>
+          <p:cNvPicPr>
+            <a:picLocks noChangeAspect="1"/>
+          </p:cNvPicPr>
+          <p:nvPr/>
+        </p:nvPicPr>
+        <p:blipFill rotWithShape="1">
+          <a:blip r:embed="rId6">
+            <a:extLst>
+              <a:ext uri="{28A0092B-C50C-407E-A947-70E740481C1C}">
+                <a14:useLocalDpi xmlns:a14="http://schemas.microsoft.com/office/drawing/2010/main" val="0"/>
+              </a:ext>
+            </a:extLst>
+          </a:blip>
+          <a:srcRect l="21568" t="30473" r="50455" b="50586"/>
+          <a:stretch/>
+        </p:blipFill>
+        <p:spPr>
+          <a:xfrm>
+            <a:off x="-4906533" y="2135829"/>
+            <a:ext cx="3581400" cy="1515421"/>
+          </a:xfrm>
+          <a:prstGeom prst="rect">
+            <a:avLst/>
+          </a:prstGeom>
+        </p:spPr>
+      </p:pic>
+      <p:sp>
+        <p:nvSpPr>
+          <p:cNvPr id="8" name="Rectangle 7"/>
+          <p:cNvSpPr/>
+          <p:nvPr/>
+        </p:nvSpPr>
+        <p:spPr>
+          <a:xfrm>
+            <a:off x="-627642" y="-480793"/>
+            <a:ext cx="14742683" cy="9644360"/>
+          </a:xfrm>
+          <a:prstGeom prst="rect">
+            <a:avLst/>
+          </a:prstGeom>
+          <a:solidFill>
+            <a:schemeClr val="tx1">
+              <a:lumMod val="75000"/>
+              <a:lumOff val="25000"/>
+              <a:alpha val="52000"/>
+            </a:schemeClr>
+          </a:solidFill>
+          <a:ln>
+            <a:noFill/>
+          </a:ln>
+        </p:spPr>
+        <p:style>
+          <a:lnRef idx="2">
+            <a:schemeClr val="accent1">
+              <a:shade val="50000"/>
+            </a:schemeClr>
+          </a:lnRef>
+          <a:fillRef idx="1">
+            <a:schemeClr val="accent1"/>
+          </a:fillRef>
+          <a:effectRef idx="0">
+            <a:schemeClr val="accent1"/>
+          </a:effectRef>
+          <a:fontRef idx="minor">
+            <a:schemeClr val="lt1"/>
+          </a:fontRef>
+        </p:style>
+        <p:txBody>
+          <a:bodyPr rtlCol="0" anchor="ctr"/>
+          <a:lstStyle/>
+          <a:p>
+            <a:pPr algn="ctr"/>
+            <a:endParaRPr lang="en-US"/>
+          </a:p>
+        </p:txBody>
+      </p:sp>
+      <p:pic>
+        <p:nvPicPr>
+          <p:cNvPr id="10" name="Picture 9"/>
+          <p:cNvPicPr>
+            <a:picLocks noChangeAspect="1"/>
+          </p:cNvPicPr>
+          <p:nvPr/>
+        </p:nvPicPr>
+        <p:blipFill>
+          <a:blip r:embed="rId7">
+            <a:extLst>
+              <a:ext uri="{28A0092B-C50C-407E-A947-70E740481C1C}">
+                <a14:useLocalDpi xmlns:a14="http://schemas.microsoft.com/office/drawing/2010/main" val="0"/>
+              </a:ext>
+            </a:extLst>
+          </a:blip>
+          <a:stretch>
+            <a:fillRect/>
+          </a:stretch>
+        </p:blipFill>
+        <p:spPr>
+          <a:xfrm>
+            <a:off x="-7070874" y="-1186500"/>
+            <a:ext cx="5308600" cy="2362200"/>
+          </a:xfrm>
+          <a:prstGeom prst="rect">
+            <a:avLst/>
+          </a:prstGeom>
+        </p:spPr>
+      </p:pic>
+      <p:pic>
+        <p:nvPicPr>
+          <p:cNvPr id="11" name="Picture 10"/>
+          <p:cNvPicPr>
+            <a:picLocks noChangeAspect="1"/>
+          </p:cNvPicPr>
+          <p:nvPr/>
+        </p:nvPicPr>
+        <p:blipFill>
+          <a:blip r:embed="rId8">
+            <a:extLst>
+              <a:ext uri="{28A0092B-C50C-407E-A947-70E740481C1C}">
+                <a14:useLocalDpi xmlns:a14="http://schemas.microsoft.com/office/drawing/2010/main" val="0"/>
+              </a:ext>
+            </a:extLst>
+          </a:blip>
+          <a:stretch>
+            <a:fillRect/>
+          </a:stretch>
+        </p:blipFill>
+        <p:spPr>
+          <a:xfrm>
+            <a:off x="14611633" y="4112270"/>
+            <a:ext cx="5359400" cy="3086100"/>
+          </a:xfrm>
+          <a:prstGeom prst="rect">
+            <a:avLst/>
+          </a:prstGeom>
+        </p:spPr>
+      </p:pic>
+      <p:pic>
+        <p:nvPicPr>
+          <p:cNvPr id="16" name="Picture 15"/>
+          <p:cNvPicPr>
+            <a:picLocks noChangeAspect="1"/>
+          </p:cNvPicPr>
+          <p:nvPr/>
+        </p:nvPicPr>
+        <p:blipFill rotWithShape="1">
+          <a:blip r:embed="rId9">
+            <a:extLst>
+              <a:ext uri="{28A0092B-C50C-407E-A947-70E740481C1C}">
+                <a14:useLocalDpi xmlns:a14="http://schemas.microsoft.com/office/drawing/2010/main" val="0"/>
+              </a:ext>
+            </a:extLst>
+          </a:blip>
+          <a:srcRect l="370" r="358"/>
+          <a:stretch/>
+        </p:blipFill>
+        <p:spPr>
+          <a:xfrm>
+            <a:off x="3787059" y="1906663"/>
+            <a:ext cx="5307716" cy="2781300"/>
+          </a:xfrm>
+          <a:prstGeom prst="rect">
+            <a:avLst/>
+          </a:prstGeom>
+        </p:spPr>
+      </p:pic>
+      <p:sp>
+        <p:nvSpPr>
+          <p:cNvPr id="17" name="TextBox 16"/>
+          <p:cNvSpPr txBox="1"/>
+          <p:nvPr/>
+        </p:nvSpPr>
+        <p:spPr>
+          <a:xfrm>
+            <a:off x="212563" y="131235"/>
+            <a:ext cx="2343911" cy="523220"/>
+          </a:xfrm>
+          <a:prstGeom prst="rect">
+            <a:avLst/>
+          </a:prstGeom>
+          <a:noFill/>
+        </p:spPr>
+        <p:txBody>
+          <a:bodyPr wrap="none" rtlCol="0">
+            <a:spAutoFit/>
+          </a:bodyPr>
+          <a:lstStyle/>
+          <a:p>
+            <a:r>
+              <a:rPr lang="en-US" sz="2800" dirty="0" smtClean="0">
+                <a:latin typeface="Helvetica" charset="0"/>
+                <a:ea typeface="Helvetica" charset="0"/>
+                <a:cs typeface="Helvetica" charset="0"/>
+              </a:rPr>
+              <a:t>Round: 1 / 12</a:t>
+            </a:r>
+            <a:endParaRPr lang="en-US" sz="2800" dirty="0">
+              <a:latin typeface="Helvetica" charset="0"/>
+              <a:ea typeface="Helvetica" charset="0"/>
+              <a:cs typeface="Helvetica" charset="0"/>
+            </a:endParaRPr>
+          </a:p>
+        </p:txBody>
+      </p:sp>
+      <p:sp>
+        <p:nvSpPr>
+          <p:cNvPr id="23" name="TextBox 22"/>
+          <p:cNvSpPr txBox="1"/>
+          <p:nvPr/>
+        </p:nvSpPr>
+        <p:spPr>
+          <a:xfrm>
+            <a:off x="5618409" y="127611"/>
+            <a:ext cx="1436932" cy="523220"/>
+          </a:xfrm>
+          <a:prstGeom prst="rect">
+            <a:avLst/>
+          </a:prstGeom>
+          <a:noFill/>
+        </p:spPr>
+        <p:txBody>
+          <a:bodyPr wrap="none" rtlCol="0">
+            <a:spAutoFit/>
+          </a:bodyPr>
+          <a:lstStyle/>
+          <a:p>
+            <a:r>
+              <a:rPr lang="en-US" sz="2800" b="1" dirty="0" smtClean="0">
+                <a:latin typeface="Helvetica" charset="0"/>
+                <a:ea typeface="Helvetica" charset="0"/>
+                <a:cs typeface="Helvetica" charset="0"/>
+              </a:rPr>
+              <a:t>Time: </a:t>
+            </a:r>
+            <a:r>
+              <a:rPr lang="en-US" sz="2800" b="1" dirty="0" smtClean="0">
+                <a:solidFill>
+                  <a:schemeClr val="accent6">
+                    <a:lumMod val="75000"/>
+                  </a:schemeClr>
+                </a:solidFill>
+                <a:latin typeface="Helvetica" charset="0"/>
+                <a:ea typeface="Helvetica" charset="0"/>
+                <a:cs typeface="Helvetica" charset="0"/>
+              </a:rPr>
+              <a:t>0</a:t>
+            </a:r>
+            <a:endParaRPr lang="en-US" sz="2800" b="1" dirty="0">
+              <a:solidFill>
+                <a:schemeClr val="accent6">
+                  <a:lumMod val="75000"/>
+                </a:schemeClr>
+              </a:solidFill>
+              <a:latin typeface="Helvetica" charset="0"/>
+              <a:ea typeface="Helvetica" charset="0"/>
+              <a:cs typeface="Helvetica" charset="0"/>
+            </a:endParaRPr>
+          </a:p>
+        </p:txBody>
+      </p:sp>
+      <p:sp>
+        <p:nvSpPr>
+          <p:cNvPr id="18" name="Rectangle 17"/>
+          <p:cNvSpPr/>
+          <p:nvPr/>
+        </p:nvSpPr>
+        <p:spPr>
+          <a:xfrm>
+            <a:off x="3964463" y="2122879"/>
+            <a:ext cx="4768990" cy="1186136"/>
+          </a:xfrm>
+          <a:prstGeom prst="rect">
+            <a:avLst/>
+          </a:prstGeom>
+          <a:solidFill>
+            <a:schemeClr val="bg1"/>
+          </a:solidFill>
+          <a:ln>
+            <a:noFill/>
+          </a:ln>
+        </p:spPr>
+        <p:style>
+          <a:lnRef idx="2">
+            <a:schemeClr val="accent1">
+              <a:shade val="50000"/>
+            </a:schemeClr>
+          </a:lnRef>
+          <a:fillRef idx="1">
+            <a:schemeClr val="accent1"/>
+          </a:fillRef>
+          <a:effectRef idx="0">
+            <a:schemeClr val="accent1"/>
+          </a:effectRef>
+          <a:fontRef idx="minor">
+            <a:schemeClr val="lt1"/>
+          </a:fontRef>
+        </p:style>
+        <p:txBody>
+          <a:bodyPr rtlCol="0" anchor="ctr"/>
+          <a:lstStyle/>
+          <a:p>
+            <a:pPr algn="ctr"/>
+            <a:r>
+              <a:rPr lang="en-US" smtClean="0"/>
+              <a:t>BaB</a:t>
+            </a:r>
+            <a:endParaRPr lang="en-US" dirty="0"/>
+          </a:p>
+        </p:txBody>
+      </p:sp>
+      <p:sp>
+        <p:nvSpPr>
+          <p:cNvPr id="19" name="TextBox 18"/>
+          <p:cNvSpPr txBox="1"/>
+          <p:nvPr/>
+        </p:nvSpPr>
+        <p:spPr>
+          <a:xfrm>
+            <a:off x="3787059" y="2266524"/>
+            <a:ext cx="5307716" cy="892552"/>
+          </a:xfrm>
+          <a:prstGeom prst="rect">
+            <a:avLst/>
+          </a:prstGeom>
+          <a:noFill/>
+        </p:spPr>
+        <p:txBody>
+          <a:bodyPr wrap="square" rtlCol="0">
+            <a:spAutoFit/>
+          </a:bodyPr>
+          <a:lstStyle/>
+          <a:p>
+            <a:pPr algn="ctr"/>
+            <a:r>
+              <a:rPr lang="en-US" sz="2600" b="1" dirty="0" smtClean="0">
+                <a:solidFill>
+                  <a:srgbClr val="C00000"/>
+                </a:solidFill>
+              </a:rPr>
+              <a:t>You should have gathered</a:t>
+            </a:r>
+          </a:p>
+          <a:p>
+            <a:pPr algn="ctr"/>
+            <a:r>
+              <a:rPr lang="en-US" sz="2600" b="1" dirty="0" smtClean="0">
+                <a:solidFill>
+                  <a:srgbClr val="C00000"/>
+                </a:solidFill>
+              </a:rPr>
+              <a:t>more/less information!</a:t>
+            </a:r>
+            <a:endParaRPr lang="en-US" sz="2600" b="1" dirty="0">
+              <a:solidFill>
+                <a:srgbClr val="C00000"/>
+              </a:solidFill>
+            </a:endParaRPr>
+          </a:p>
+        </p:txBody>
+      </p:sp>
+      <p:sp>
+        <p:nvSpPr>
+          <p:cNvPr id="20" name="Rectangle 19"/>
+          <p:cNvSpPr/>
+          <p:nvPr/>
+        </p:nvSpPr>
+        <p:spPr>
+          <a:xfrm>
+            <a:off x="4023558" y="3146657"/>
+            <a:ext cx="4768990" cy="464046"/>
+          </a:xfrm>
+          <a:prstGeom prst="rect">
+            <a:avLst/>
+          </a:prstGeom>
+          <a:solidFill>
+            <a:schemeClr val="bg1"/>
+          </a:solidFill>
+          <a:ln>
+            <a:noFill/>
+          </a:ln>
+        </p:spPr>
+        <p:style>
+          <a:lnRef idx="2">
+            <a:schemeClr val="accent1">
+              <a:shade val="50000"/>
+            </a:schemeClr>
+          </a:lnRef>
+          <a:fillRef idx="1">
+            <a:schemeClr val="accent1"/>
+          </a:fillRef>
+          <a:effectRef idx="0">
+            <a:schemeClr val="accent1"/>
+          </a:effectRef>
+          <a:fontRef idx="minor">
+            <a:schemeClr val="lt1"/>
+          </a:fontRef>
+        </p:style>
+        <p:txBody>
+          <a:bodyPr rtlCol="0" anchor="ctr"/>
+          <a:lstStyle/>
+          <a:p>
+            <a:pPr algn="ctr"/>
+            <a:r>
+              <a:rPr lang="en-US" smtClean="0"/>
+              <a:t>BaB</a:t>
+            </a:r>
+            <a:endParaRPr lang="en-US" dirty="0"/>
+          </a:p>
+        </p:txBody>
+      </p:sp>
+    </p:spTree>
+    <p:extLst>
+      <p:ext uri="{BB962C8B-B14F-4D97-AF65-F5344CB8AC3E}">
+        <p14:creationId xmlns:p14="http://schemas.microsoft.com/office/powerpoint/2010/main" val="895656108"/>
+      </p:ext>
+    </p:extLst>
+  </p:cSld>
+  <p:clrMapOvr>
+    <a:masterClrMapping/>
+  </p:clrMapOvr>
+  <p:timing>
+    <p:tnLst>
+      <p:par>
+        <p:cTn id="1" dur="indefinite" restart="never" nodeType="tmRoot"/>
+      </p:par>
+    </p:tnLst>
+  </p:timing>
+</p:sld>
+</file>
+
+<file path=ppt/slides/slide8.xml><?xml version="1.0" encoding="utf-8"?>
+<p:sld xmlns:a="http://schemas.openxmlformats.org/drawingml/2006/main" xmlns:r="http://schemas.openxmlformats.org/officeDocument/2006/relationships" xmlns:p="http://schemas.openxmlformats.org/presentationml/2006/main">
+  <p:cSld>
+    <p:spTree>
+      <p:nvGrpSpPr>
+        <p:cNvPr id="1" name=""/>
+        <p:cNvGrpSpPr/>
+        <p:nvPr/>
+      </p:nvGrpSpPr>
+      <p:grpSpPr>
+        <a:xfrm>
+          <a:off x="0" y="0"/>
+          <a:ext cx="0" cy="0"/>
+          <a:chOff x="0" y="0"/>
+          <a:chExt cx="0" cy="0"/>
+        </a:xfrm>
+      </p:grpSpPr>
+      <p:pic>
+        <p:nvPicPr>
+          <p:cNvPr id="5" name="Picture 4"/>
+          <p:cNvPicPr>
+            <a:picLocks noChangeAspect="1"/>
+          </p:cNvPicPr>
+          <p:nvPr/>
+        </p:nvPicPr>
+        <p:blipFill>
+          <a:blip r:embed="rId2">
+            <a:extLst>
+              <a:ext uri="{28A0092B-C50C-407E-A947-70E740481C1C}">
+                <a14:useLocalDpi xmlns:a14="http://schemas.microsoft.com/office/drawing/2010/main" val="0"/>
+              </a:ext>
+            </a:extLst>
+          </a:blip>
+          <a:stretch>
+            <a:fillRect/>
+          </a:stretch>
+        </p:blipFill>
+        <p:spPr>
+          <a:xfrm>
+            <a:off x="-4333" y="-5400"/>
+            <a:ext cx="12852400" cy="8001000"/>
+          </a:xfrm>
+          <a:prstGeom prst="rect">
+            <a:avLst/>
+          </a:prstGeom>
+        </p:spPr>
+      </p:pic>
+      <p:sp>
+        <p:nvSpPr>
+          <p:cNvPr id="4" name="Rectangle 3"/>
+          <p:cNvSpPr/>
+          <p:nvPr/>
+        </p:nvSpPr>
+        <p:spPr>
+          <a:xfrm>
+            <a:off x="5666793" y="-571597"/>
+            <a:ext cx="2153812" cy="1186136"/>
+          </a:xfrm>
+          <a:prstGeom prst="rect">
+            <a:avLst/>
+          </a:prstGeom>
+          <a:solidFill>
+            <a:schemeClr val="bg1"/>
+          </a:solidFill>
+          <a:ln>
+            <a:noFill/>
+          </a:ln>
+        </p:spPr>
+        <p:style>
+          <a:lnRef idx="2">
+            <a:schemeClr val="accent1">
+              <a:shade val="50000"/>
+            </a:schemeClr>
+          </a:lnRef>
+          <a:fillRef idx="1">
+            <a:schemeClr val="accent1"/>
+          </a:fillRef>
+          <a:effectRef idx="0">
+            <a:schemeClr val="accent1"/>
+          </a:effectRef>
+          <a:fontRef idx="minor">
+            <a:schemeClr val="lt1"/>
+          </a:fontRef>
+        </p:style>
+        <p:txBody>
+          <a:bodyPr rtlCol="0" anchor="ctr"/>
+          <a:lstStyle/>
+          <a:p>
+            <a:pPr algn="ctr"/>
+            <a:endParaRPr lang="en-US"/>
+          </a:p>
+        </p:txBody>
+      </p:sp>
+      <p:sp>
+        <p:nvSpPr>
+          <p:cNvPr id="7" name="Rectangle 6"/>
+          <p:cNvSpPr/>
+          <p:nvPr/>
+        </p:nvSpPr>
+        <p:spPr>
+          <a:xfrm>
+            <a:off x="-162506" y="-376905"/>
+            <a:ext cx="2153812" cy="1186136"/>
+          </a:xfrm>
+          <a:prstGeom prst="rect">
+            <a:avLst/>
+          </a:prstGeom>
+          <a:solidFill>
+            <a:schemeClr val="bg1"/>
+          </a:solidFill>
+          <a:ln>
+            <a:noFill/>
+          </a:ln>
+        </p:spPr>
+        <p:style>
+          <a:lnRef idx="2">
+            <a:schemeClr val="accent1">
+              <a:shade val="50000"/>
+            </a:schemeClr>
+          </a:lnRef>
+          <a:fillRef idx="1">
+            <a:schemeClr val="accent1"/>
+          </a:fillRef>
+          <a:effectRef idx="0">
+            <a:schemeClr val="accent1"/>
+          </a:effectRef>
+          <a:fontRef idx="minor">
+            <a:schemeClr val="lt1"/>
+          </a:fontRef>
+        </p:style>
+        <p:txBody>
+          <a:bodyPr rtlCol="0" anchor="ctr"/>
+          <a:lstStyle/>
+          <a:p>
+            <a:pPr algn="ctr"/>
+            <a:endParaRPr lang="en-US"/>
+          </a:p>
+        </p:txBody>
+      </p:sp>
+      <p:pic>
+        <p:nvPicPr>
+          <p:cNvPr id="2" name="Picture 1"/>
+          <p:cNvPicPr>
+            <a:picLocks noChangeAspect="1"/>
+          </p:cNvPicPr>
+          <p:nvPr/>
+        </p:nvPicPr>
+        <p:blipFill rotWithShape="1">
+          <a:blip r:embed="rId3">
+            <a:extLst>
+              <a:ext uri="{28A0092B-C50C-407E-A947-70E740481C1C}">
+                <a14:useLocalDpi xmlns:a14="http://schemas.microsoft.com/office/drawing/2010/main" val="0"/>
+              </a:ext>
+            </a:extLst>
+          </a:blip>
+          <a:srcRect l="21698" t="30001" r="50397" b="50714"/>
+          <a:stretch/>
+        </p:blipFill>
+        <p:spPr>
+          <a:xfrm>
+            <a:off x="-4770883" y="4527550"/>
+            <a:ext cx="3572467" cy="1543050"/>
+          </a:xfrm>
+          <a:prstGeom prst="rect">
+            <a:avLst/>
+          </a:prstGeom>
+        </p:spPr>
+      </p:pic>
+      <p:sp>
+        <p:nvSpPr>
+          <p:cNvPr id="12" name="Rectangle 11"/>
+          <p:cNvSpPr/>
+          <p:nvPr/>
+        </p:nvSpPr>
+        <p:spPr>
+          <a:xfrm>
+            <a:off x="-664733" y="7626825"/>
+            <a:ext cx="14173200" cy="838200"/>
+          </a:xfrm>
+          <a:prstGeom prst="rect">
+            <a:avLst/>
+          </a:prstGeom>
+          <a:solidFill>
+            <a:schemeClr val="bg1"/>
+          </a:solidFill>
+          <a:ln>
+            <a:noFill/>
+          </a:ln>
+        </p:spPr>
+        <p:style>
+          <a:lnRef idx="2">
+            <a:schemeClr val="accent1">
+              <a:shade val="50000"/>
+            </a:schemeClr>
+          </a:lnRef>
+          <a:fillRef idx="1">
+            <a:schemeClr val="accent1"/>
+          </a:fillRef>
+          <a:effectRef idx="0">
+            <a:schemeClr val="accent1"/>
+          </a:effectRef>
+          <a:fontRef idx="minor">
+            <a:schemeClr val="lt1"/>
+          </a:fontRef>
+        </p:style>
+        <p:txBody>
+          <a:bodyPr rtlCol="0" anchor="ctr"/>
+          <a:lstStyle/>
+          <a:p>
+            <a:pPr algn="ctr"/>
+            <a:endParaRPr lang="en-US"/>
+          </a:p>
+        </p:txBody>
+      </p:sp>
+      <p:pic>
+        <p:nvPicPr>
+          <p:cNvPr id="13" name="Picture 12"/>
+          <p:cNvPicPr>
+            <a:picLocks noChangeAspect="1"/>
+          </p:cNvPicPr>
+          <p:nvPr/>
+        </p:nvPicPr>
+        <p:blipFill>
+          <a:blip r:embed="rId4">
+            <a:extLst>
+              <a:ext uri="{28A0092B-C50C-407E-A947-70E740481C1C}">
+                <a14:useLocalDpi xmlns:a14="http://schemas.microsoft.com/office/drawing/2010/main" val="0"/>
+              </a:ext>
+            </a:extLst>
+          </a:blip>
+          <a:stretch>
+            <a:fillRect/>
+          </a:stretch>
+        </p:blipFill>
+        <p:spPr>
+          <a:xfrm>
+            <a:off x="4618467" y="7633175"/>
+            <a:ext cx="3606800" cy="482600"/>
+          </a:xfrm>
+          <a:prstGeom prst="rect">
+            <a:avLst/>
+          </a:prstGeom>
+        </p:spPr>
+      </p:pic>
+      <p:pic>
+        <p:nvPicPr>
+          <p:cNvPr id="14" name="Picture 13"/>
+          <p:cNvPicPr>
+            <a:picLocks noChangeAspect="1"/>
+          </p:cNvPicPr>
+          <p:nvPr/>
+        </p:nvPicPr>
+        <p:blipFill>
+          <a:blip r:embed="rId5">
+            <a:extLst>
+              <a:ext uri="{28A0092B-C50C-407E-A947-70E740481C1C}">
+                <a14:useLocalDpi xmlns:a14="http://schemas.microsoft.com/office/drawing/2010/main" val="0"/>
+              </a:ext>
+            </a:extLst>
+          </a:blip>
+          <a:stretch>
+            <a:fillRect/>
+          </a:stretch>
+        </p:blipFill>
+        <p:spPr>
+          <a:xfrm>
+            <a:off x="5956300" y="3651250"/>
+            <a:ext cx="939800" cy="876300"/>
+          </a:xfrm>
+          <a:prstGeom prst="rect">
+            <a:avLst/>
+          </a:prstGeom>
+        </p:spPr>
+      </p:pic>
+      <p:sp>
+        <p:nvSpPr>
+          <p:cNvPr id="15" name="Rectangle 14"/>
+          <p:cNvSpPr/>
+          <p:nvPr/>
+        </p:nvSpPr>
+        <p:spPr>
+          <a:xfrm>
+            <a:off x="5956299" y="3695911"/>
+            <a:ext cx="901701" cy="723689"/>
+          </a:xfrm>
+          <a:prstGeom prst="rect">
+            <a:avLst/>
+          </a:prstGeom>
+          <a:solidFill>
+            <a:schemeClr val="bg1"/>
+          </a:solidFill>
+          <a:ln>
+            <a:noFill/>
+          </a:ln>
+        </p:spPr>
+        <p:style>
+          <a:lnRef idx="2">
+            <a:schemeClr val="accent1">
+              <a:shade val="50000"/>
+            </a:schemeClr>
+          </a:lnRef>
+          <a:fillRef idx="1">
+            <a:schemeClr val="accent1"/>
+          </a:fillRef>
+          <a:effectRef idx="0">
+            <a:schemeClr val="accent1"/>
+          </a:effectRef>
+          <a:fontRef idx="minor">
+            <a:schemeClr val="lt1"/>
+          </a:fontRef>
+        </p:style>
+        <p:txBody>
+          <a:bodyPr rtlCol="0" anchor="ctr"/>
+          <a:lstStyle/>
+          <a:p>
+            <a:pPr algn="ctr"/>
+            <a:endParaRPr lang="en-US"/>
+          </a:p>
+        </p:txBody>
+      </p:sp>
+      <p:pic>
+        <p:nvPicPr>
+          <p:cNvPr id="3" name="Picture 2"/>
+          <p:cNvPicPr>
+            <a:picLocks noChangeAspect="1"/>
+          </p:cNvPicPr>
+          <p:nvPr/>
+        </p:nvPicPr>
+        <p:blipFill rotWithShape="1">
+          <a:blip r:embed="rId6">
+            <a:extLst>
+              <a:ext uri="{28A0092B-C50C-407E-A947-70E740481C1C}">
+                <a14:useLocalDpi xmlns:a14="http://schemas.microsoft.com/office/drawing/2010/main" val="0"/>
+              </a:ext>
+            </a:extLst>
+          </a:blip>
+          <a:srcRect l="21568" t="30473" r="50455" b="50586"/>
+          <a:stretch/>
+        </p:blipFill>
+        <p:spPr>
+          <a:xfrm>
+            <a:off x="-4906533" y="2135829"/>
+            <a:ext cx="3581400" cy="1515421"/>
+          </a:xfrm>
+          <a:prstGeom prst="rect">
+            <a:avLst/>
+          </a:prstGeom>
+        </p:spPr>
+      </p:pic>
+      <p:sp>
+        <p:nvSpPr>
+          <p:cNvPr id="8" name="Rectangle 7"/>
+          <p:cNvSpPr/>
+          <p:nvPr/>
+        </p:nvSpPr>
+        <p:spPr>
+          <a:xfrm>
+            <a:off x="-627642" y="-480793"/>
+            <a:ext cx="14742683" cy="9644360"/>
+          </a:xfrm>
+          <a:prstGeom prst="rect">
+            <a:avLst/>
+          </a:prstGeom>
+          <a:solidFill>
+            <a:schemeClr val="tx1">
+              <a:lumMod val="75000"/>
+              <a:lumOff val="25000"/>
+              <a:alpha val="52000"/>
+            </a:schemeClr>
+          </a:solidFill>
+          <a:ln>
+            <a:noFill/>
+          </a:ln>
+        </p:spPr>
+        <p:style>
+          <a:lnRef idx="2">
+            <a:schemeClr val="accent1">
+              <a:shade val="50000"/>
+            </a:schemeClr>
+          </a:lnRef>
+          <a:fillRef idx="1">
+            <a:schemeClr val="accent1"/>
+          </a:fillRef>
+          <a:effectRef idx="0">
+            <a:schemeClr val="accent1"/>
+          </a:effectRef>
+          <a:fontRef idx="minor">
+            <a:schemeClr val="lt1"/>
+          </a:fontRef>
+        </p:style>
+        <p:txBody>
+          <a:bodyPr rtlCol="0" anchor="ctr"/>
+          <a:lstStyle/>
+          <a:p>
+            <a:pPr algn="ctr"/>
+            <a:endParaRPr lang="en-US"/>
+          </a:p>
+        </p:txBody>
+      </p:sp>
+      <p:pic>
+        <p:nvPicPr>
+          <p:cNvPr id="10" name="Picture 9"/>
+          <p:cNvPicPr>
+            <a:picLocks noChangeAspect="1"/>
+          </p:cNvPicPr>
+          <p:nvPr/>
+        </p:nvPicPr>
+        <p:blipFill>
+          <a:blip r:embed="rId7">
+            <a:extLst>
+              <a:ext uri="{28A0092B-C50C-407E-A947-70E740481C1C}">
+                <a14:useLocalDpi xmlns:a14="http://schemas.microsoft.com/office/drawing/2010/main" val="0"/>
+              </a:ext>
+            </a:extLst>
+          </a:blip>
+          <a:stretch>
+            <a:fillRect/>
+          </a:stretch>
+        </p:blipFill>
+        <p:spPr>
+          <a:xfrm>
+            <a:off x="-7070874" y="-1186500"/>
+            <a:ext cx="5308600" cy="2362200"/>
+          </a:xfrm>
+          <a:prstGeom prst="rect">
+            <a:avLst/>
+          </a:prstGeom>
+        </p:spPr>
+      </p:pic>
+      <p:pic>
+        <p:nvPicPr>
+          <p:cNvPr id="11" name="Picture 10"/>
+          <p:cNvPicPr>
+            <a:picLocks noChangeAspect="1"/>
+          </p:cNvPicPr>
+          <p:nvPr/>
+        </p:nvPicPr>
+        <p:blipFill>
+          <a:blip r:embed="rId8">
+            <a:extLst>
+              <a:ext uri="{28A0092B-C50C-407E-A947-70E740481C1C}">
+                <a14:useLocalDpi xmlns:a14="http://schemas.microsoft.com/office/drawing/2010/main" val="0"/>
+              </a:ext>
+            </a:extLst>
+          </a:blip>
+          <a:stretch>
+            <a:fillRect/>
+          </a:stretch>
+        </p:blipFill>
+        <p:spPr>
+          <a:xfrm>
+            <a:off x="14611633" y="4112270"/>
+            <a:ext cx="5359400" cy="3086100"/>
+          </a:xfrm>
+          <a:prstGeom prst="rect">
+            <a:avLst/>
+          </a:prstGeom>
+        </p:spPr>
+      </p:pic>
+      <p:pic>
+        <p:nvPicPr>
+          <p:cNvPr id="16" name="Picture 15"/>
+          <p:cNvPicPr>
+            <a:picLocks noChangeAspect="1"/>
+          </p:cNvPicPr>
+          <p:nvPr/>
+        </p:nvPicPr>
+        <p:blipFill rotWithShape="1">
+          <a:blip r:embed="rId9">
+            <a:extLst>
+              <a:ext uri="{28A0092B-C50C-407E-A947-70E740481C1C}">
+                <a14:useLocalDpi xmlns:a14="http://schemas.microsoft.com/office/drawing/2010/main" val="0"/>
+              </a:ext>
+            </a:extLst>
+          </a:blip>
+          <a:srcRect l="370" r="358"/>
+          <a:stretch/>
+        </p:blipFill>
+        <p:spPr>
+          <a:xfrm>
+            <a:off x="3787059" y="1906663"/>
+            <a:ext cx="5307716" cy="2781300"/>
+          </a:xfrm>
+          <a:prstGeom prst="rect">
+            <a:avLst/>
+          </a:prstGeom>
+        </p:spPr>
+      </p:pic>
+      <p:sp>
+        <p:nvSpPr>
+          <p:cNvPr id="17" name="TextBox 16"/>
+          <p:cNvSpPr txBox="1"/>
+          <p:nvPr/>
+        </p:nvSpPr>
+        <p:spPr>
+          <a:xfrm>
+            <a:off x="212563" y="131235"/>
+            <a:ext cx="2343911" cy="523220"/>
+          </a:xfrm>
+          <a:prstGeom prst="rect">
+            <a:avLst/>
+          </a:prstGeom>
+          <a:noFill/>
+        </p:spPr>
+        <p:txBody>
+          <a:bodyPr wrap="none" rtlCol="0">
+            <a:spAutoFit/>
+          </a:bodyPr>
+          <a:lstStyle/>
+          <a:p>
+            <a:r>
+              <a:rPr lang="en-US" sz="2800" dirty="0" smtClean="0">
+                <a:latin typeface="Helvetica" charset="0"/>
+                <a:ea typeface="Helvetica" charset="0"/>
+                <a:cs typeface="Helvetica" charset="0"/>
+              </a:rPr>
+              <a:t>Round: 1 / 12</a:t>
+            </a:r>
+            <a:endParaRPr lang="en-US" sz="2800" dirty="0">
+              <a:latin typeface="Helvetica" charset="0"/>
+              <a:ea typeface="Helvetica" charset="0"/>
+              <a:cs typeface="Helvetica" charset="0"/>
+            </a:endParaRPr>
+          </a:p>
+        </p:txBody>
+      </p:sp>
+      <p:sp>
+        <p:nvSpPr>
+          <p:cNvPr id="23" name="TextBox 22"/>
+          <p:cNvSpPr txBox="1"/>
+          <p:nvPr/>
+        </p:nvSpPr>
+        <p:spPr>
+          <a:xfrm>
+            <a:off x="5618409" y="127611"/>
+            <a:ext cx="1436932" cy="523220"/>
+          </a:xfrm>
+          <a:prstGeom prst="rect">
+            <a:avLst/>
+          </a:prstGeom>
+          <a:noFill/>
+        </p:spPr>
+        <p:txBody>
+          <a:bodyPr wrap="none" rtlCol="0">
+            <a:spAutoFit/>
+          </a:bodyPr>
+          <a:lstStyle/>
+          <a:p>
+            <a:r>
+              <a:rPr lang="en-US" sz="2800" b="1" dirty="0" smtClean="0">
+                <a:latin typeface="Helvetica" charset="0"/>
+                <a:ea typeface="Helvetica" charset="0"/>
+                <a:cs typeface="Helvetica" charset="0"/>
+              </a:rPr>
+              <a:t>Time: </a:t>
+            </a:r>
+            <a:r>
+              <a:rPr lang="en-US" sz="2800" b="1" dirty="0" smtClean="0">
+                <a:solidFill>
+                  <a:schemeClr val="accent6">
+                    <a:lumMod val="75000"/>
+                  </a:schemeClr>
+                </a:solidFill>
+                <a:latin typeface="Helvetica" charset="0"/>
+                <a:ea typeface="Helvetica" charset="0"/>
+                <a:cs typeface="Helvetica" charset="0"/>
+              </a:rPr>
+              <a:t>0</a:t>
+            </a:r>
+            <a:endParaRPr lang="en-US" sz="2800" b="1" dirty="0">
+              <a:solidFill>
+                <a:schemeClr val="accent6">
+                  <a:lumMod val="75000"/>
+                </a:schemeClr>
+              </a:solidFill>
+              <a:latin typeface="Helvetica" charset="0"/>
+              <a:ea typeface="Helvetica" charset="0"/>
+              <a:cs typeface="Helvetica" charset="0"/>
+            </a:endParaRPr>
+          </a:p>
+        </p:txBody>
+      </p:sp>
+      <p:sp>
+        <p:nvSpPr>
+          <p:cNvPr id="18" name="Rectangle 17"/>
+          <p:cNvSpPr/>
+          <p:nvPr/>
+        </p:nvSpPr>
+        <p:spPr>
+          <a:xfrm>
+            <a:off x="3964463" y="2122879"/>
+            <a:ext cx="4768990" cy="1186136"/>
+          </a:xfrm>
+          <a:prstGeom prst="rect">
+            <a:avLst/>
+          </a:prstGeom>
+          <a:solidFill>
+            <a:schemeClr val="bg1"/>
+          </a:solidFill>
+          <a:ln>
+            <a:noFill/>
+          </a:ln>
+        </p:spPr>
+        <p:style>
+          <a:lnRef idx="2">
+            <a:schemeClr val="accent1">
+              <a:shade val="50000"/>
+            </a:schemeClr>
+          </a:lnRef>
+          <a:fillRef idx="1">
+            <a:schemeClr val="accent1"/>
+          </a:fillRef>
+          <a:effectRef idx="0">
+            <a:schemeClr val="accent1"/>
+          </a:effectRef>
+          <a:fontRef idx="minor">
+            <a:schemeClr val="lt1"/>
+          </a:fontRef>
+        </p:style>
+        <p:txBody>
+          <a:bodyPr rtlCol="0" anchor="ctr"/>
+          <a:lstStyle/>
+          <a:p>
+            <a:pPr algn="ctr"/>
+            <a:r>
+              <a:rPr lang="en-US" smtClean="0"/>
+              <a:t>BaB</a:t>
+            </a:r>
+            <a:endParaRPr lang="en-US" dirty="0"/>
+          </a:p>
+        </p:txBody>
+      </p:sp>
+      <p:sp>
+        <p:nvSpPr>
+          <p:cNvPr id="19" name="TextBox 18"/>
+          <p:cNvSpPr txBox="1"/>
+          <p:nvPr/>
+        </p:nvSpPr>
+        <p:spPr>
+          <a:xfrm>
+            <a:off x="3787059" y="2266524"/>
+            <a:ext cx="5307716" cy="492443"/>
+          </a:xfrm>
+          <a:prstGeom prst="rect">
+            <a:avLst/>
+          </a:prstGeom>
+          <a:noFill/>
+        </p:spPr>
+        <p:txBody>
+          <a:bodyPr wrap="square" rtlCol="0">
+            <a:spAutoFit/>
+          </a:bodyPr>
+          <a:lstStyle/>
+          <a:p>
+            <a:pPr algn="ctr"/>
+            <a:r>
+              <a:rPr lang="en-US" sz="2600" b="1" dirty="0" smtClean="0">
+                <a:solidFill>
+                  <a:srgbClr val="C00000"/>
+                </a:solidFill>
+              </a:rPr>
+              <a:t>Poor planning!</a:t>
+            </a:r>
+            <a:endParaRPr lang="en-US" sz="2600" b="1" dirty="0">
+              <a:solidFill>
+                <a:srgbClr val="C00000"/>
+              </a:solidFill>
+            </a:endParaRPr>
+          </a:p>
+        </p:txBody>
+      </p:sp>
+      <p:sp>
+        <p:nvSpPr>
+          <p:cNvPr id="20" name="Rectangle 19"/>
+          <p:cNvSpPr/>
+          <p:nvPr/>
+        </p:nvSpPr>
+        <p:spPr>
+          <a:xfrm>
+            <a:off x="4056422" y="3680520"/>
+            <a:ext cx="4768990" cy="749202"/>
+          </a:xfrm>
+          <a:prstGeom prst="rect">
+            <a:avLst/>
+          </a:prstGeom>
+          <a:solidFill>
+            <a:schemeClr val="bg1"/>
+          </a:solidFill>
+          <a:ln>
+            <a:noFill/>
+          </a:ln>
+        </p:spPr>
+        <p:style>
+          <a:lnRef idx="2">
+            <a:schemeClr val="accent1">
+              <a:shade val="50000"/>
+            </a:schemeClr>
+          </a:lnRef>
+          <a:fillRef idx="1">
+            <a:schemeClr val="accent1"/>
+          </a:fillRef>
+          <a:effectRef idx="0">
+            <a:schemeClr val="accent1"/>
+          </a:effectRef>
+          <a:fontRef idx="minor">
+            <a:schemeClr val="lt1"/>
+          </a:fontRef>
+        </p:style>
+        <p:txBody>
+          <a:bodyPr rtlCol="0" anchor="ctr"/>
+          <a:lstStyle/>
+          <a:p>
+            <a:pPr algn="ctr"/>
+            <a:r>
+              <a:rPr lang="en-US" smtClean="0"/>
+              <a:t>BaB</a:t>
+            </a:r>
+            <a:endParaRPr lang="en-US" dirty="0"/>
+          </a:p>
+        </p:txBody>
+      </p:sp>
+    </p:spTree>
+    <p:extLst>
+      <p:ext uri="{BB962C8B-B14F-4D97-AF65-F5344CB8AC3E}">
+        <p14:creationId xmlns:p14="http://schemas.microsoft.com/office/powerpoint/2010/main" val="210428029"/>
       </p:ext>
     </p:extLst>
   </p:cSld>

</xml_diff>